<commit_message>
Changes from teaching the class
</commit_message>
<xml_diff>
--- a/node/lesson-83-dustjs/dustjs.pptx
+++ b/node/lesson-83-dustjs/dustjs.pptx
@@ -2490,35 +2490,35 @@
     </dgm:pt>
   </dgm:ptLst>
   <dgm:cxnLst>
-    <dgm:cxn modelId="{A3B4ED6B-E65F-154D-867A-76DC0A3EF25B}" srcId="{1984CDB9-C88D-D64C-98E1-B35216583223}" destId="{79B192F4-1BAD-F449-BD04-E7E785211C72}" srcOrd="0" destOrd="0" parTransId="{5004FF52-0F6E-BD46-BCE9-F86B95B45A89}" sibTransId="{0F354A32-F033-E947-A137-FA1562654EA0}"/>
-    <dgm:cxn modelId="{B0886C92-13C5-0C45-818B-91BEE380B349}" srcId="{CB968AA7-A0F0-7849-A98E-3AB1ED405748}" destId="{4609A046-3EC9-924B-935A-1F33756DFFF3}" srcOrd="6" destOrd="0" parTransId="{3D03FFE7-F42C-814D-9CF6-E3CF8E6362E4}" sibTransId="{9BFEB738-684B-4147-BF2F-9E88F09BA971}"/>
-    <dgm:cxn modelId="{816F60D1-7A89-504D-8A7E-5901D4674743}" type="presOf" srcId="{371C76BF-8924-8F4E-9B48-30D0BA4B2ECD}" destId="{C90EDB04-0A65-9C4A-82E0-4BF03DAE181D}" srcOrd="0" destOrd="0" presId="urn:microsoft.com/office/officeart/2005/8/layout/vList5"/>
-    <dgm:cxn modelId="{5D537826-2D39-A942-B048-9C54C113D2B8}" type="presOf" srcId="{266FFF07-B2A8-9C4C-88CB-4658BCA3A018}" destId="{F710DE16-3D8C-2B43-A073-C7FE2C4E8D3C}" srcOrd="0" destOrd="0" presId="urn:microsoft.com/office/officeart/2005/8/layout/vList5"/>
-    <dgm:cxn modelId="{7AC65C92-D630-5641-AE43-9FFD825045CB}" srcId="{4609A046-3EC9-924B-935A-1F33756DFFF3}" destId="{BB77D17A-F4CA-9A4B-A516-2D24F5790554}" srcOrd="0" destOrd="0" parTransId="{2D35DED0-7E1E-6647-AFF9-753BA30BDECF}" sibTransId="{9A5AA540-A6B6-E54B-A9C2-3EA5B543C912}"/>
-    <dgm:cxn modelId="{C988DB80-28FD-6542-A9CF-9C45EFCF6A02}" srcId="{18801611-42AA-FB46-B87D-9781A7FFF6FB}" destId="{45CF5A76-FFF8-7E4E-8EB6-A77A9EAA0B78}" srcOrd="0" destOrd="0" parTransId="{8C670C83-437B-3B4A-BFD5-361C1CCC01F4}" sibTransId="{DA6B1EF2-2B81-384E-A6B9-1A73BB2383DE}"/>
-    <dgm:cxn modelId="{AF81CF96-2B75-0B4D-AEDC-F4BA466D8D51}" type="presOf" srcId="{D2FE5B7D-B367-4D43-9F19-8295E09075A4}" destId="{48298BF1-FA06-4043-A56D-3DE269E997B0}" srcOrd="0" destOrd="0" presId="urn:microsoft.com/office/officeart/2005/8/layout/vList5"/>
-    <dgm:cxn modelId="{E800DC21-CD4F-E64D-AB34-57F71E9CC30B}" srcId="{CB968AA7-A0F0-7849-A98E-3AB1ED405748}" destId="{A714FFC3-8131-5F4D-9502-BBB986CB1411}" srcOrd="5" destOrd="0" parTransId="{9720C7A9-4FCE-224C-962C-2840BAEE9A67}" sibTransId="{2590E8D7-8584-D54B-86AD-24E2B90A36FA}"/>
-    <dgm:cxn modelId="{89B35A46-4AC8-9D49-AA5B-99CFD11C1B59}" type="presOf" srcId="{D5D06D43-A94F-994A-B2B2-6392790ABA4A}" destId="{DDA6922B-5BC4-B541-A0CC-AE06C40993E8}" srcOrd="0" destOrd="0" presId="urn:microsoft.com/office/officeart/2005/8/layout/vList5"/>
-    <dgm:cxn modelId="{5DC9B8A0-DF56-704F-8795-BB6AD6D7D289}" srcId="{266FFF07-B2A8-9C4C-88CB-4658BCA3A018}" destId="{D5D06D43-A94F-994A-B2B2-6392790ABA4A}" srcOrd="0" destOrd="0" parTransId="{8D786B22-ED86-5E40-AFF7-3647F31EEF50}" sibTransId="{A404CE33-2FE9-C441-98FE-CC5D32003AE9}"/>
-    <dgm:cxn modelId="{28DD3188-7EDF-ED40-85F8-DF3E9A85CBC6}" type="presOf" srcId="{79B192F4-1BAD-F449-BD04-E7E785211C72}" destId="{D08EF089-5B23-CA4D-931F-98F96AF52F4A}" srcOrd="0" destOrd="0" presId="urn:microsoft.com/office/officeart/2005/8/layout/vList5"/>
-    <dgm:cxn modelId="{B1226E93-5C79-6946-B7F7-4C98DE1A5BB1}" type="presOf" srcId="{ED3848B3-A553-724A-A8BC-28D563889BD9}" destId="{2CB3C801-92E7-2343-B164-E40E55A17481}" srcOrd="0" destOrd="0" presId="urn:microsoft.com/office/officeart/2005/8/layout/vList5"/>
-    <dgm:cxn modelId="{53B7F54A-9FDB-C54E-AA88-60CA35EE02B8}" type="presOf" srcId="{1773227D-C32F-BF4B-803A-95E0F7C1EE65}" destId="{0F86DD39-EDCD-0B47-A343-E17AB49E6EB5}" srcOrd="0" destOrd="0" presId="urn:microsoft.com/office/officeart/2005/8/layout/vList5"/>
-    <dgm:cxn modelId="{DDCD928B-D311-CC4A-82F8-88D8F876B0BA}" srcId="{D2FE5B7D-B367-4D43-9F19-8295E09075A4}" destId="{1773227D-C32F-BF4B-803A-95E0F7C1EE65}" srcOrd="0" destOrd="0" parTransId="{90BA1215-A93D-5947-8218-E90710F4B2B5}" sibTransId="{7DB5371F-C42A-D541-B1D6-291E9D578D7E}"/>
-    <dgm:cxn modelId="{7E98B93A-1696-0C42-AEBB-13A04D62B514}" type="presOf" srcId="{18801611-42AA-FB46-B87D-9781A7FFF6FB}" destId="{DF1164C9-0FC7-FD41-8B69-DFEAC9313CD5}" srcOrd="0" destOrd="0" presId="urn:microsoft.com/office/officeart/2005/8/layout/vList5"/>
-    <dgm:cxn modelId="{2960B1C7-B185-1E49-B020-29B370EE6B9A}" srcId="{CB968AA7-A0F0-7849-A98E-3AB1ED405748}" destId="{18801611-42AA-FB46-B87D-9781A7FFF6FB}" srcOrd="0" destOrd="0" parTransId="{E228C804-6479-A248-8415-7BB3056AC2ED}" sibTransId="{993AD0A5-6517-704A-848C-67C8E8D12D33}"/>
-    <dgm:cxn modelId="{257D9E96-94CA-0D44-9228-D3411418FD2F}" srcId="{A714FFC3-8131-5F4D-9502-BBB986CB1411}" destId="{93B5EA41-DF56-3544-AF1D-0A6D797FABB2}" srcOrd="0" destOrd="0" parTransId="{214D6756-A30F-A240-A027-8DD468DE7F1E}" sibTransId="{CF93A6CA-0E70-B245-994C-291C63CA60AF}"/>
     <dgm:cxn modelId="{E1245178-F402-724A-9550-3F49542B05E4}" type="presOf" srcId="{A714FFC3-8131-5F4D-9502-BBB986CB1411}" destId="{475D90FA-3621-9248-AAC8-A565E6B10834}" srcOrd="0" destOrd="0" presId="urn:microsoft.com/office/officeart/2005/8/layout/vList5"/>
-    <dgm:cxn modelId="{DF44CB31-544E-4246-85BB-6903531651FD}" type="presOf" srcId="{1984CDB9-C88D-D64C-98E1-B35216583223}" destId="{AD18DFAC-62D2-B84F-A3D0-C828D592C2D1}" srcOrd="0" destOrd="0" presId="urn:microsoft.com/office/officeart/2005/8/layout/vList5"/>
-    <dgm:cxn modelId="{B03A56F7-2787-0A47-A4CB-BB104B84D5A4}" srcId="{CB968AA7-A0F0-7849-A98E-3AB1ED405748}" destId="{D2FE5B7D-B367-4D43-9F19-8295E09075A4}" srcOrd="3" destOrd="0" parTransId="{D9C48DBB-F5EF-2148-95AC-8819B7C76C2E}" sibTransId="{CE91648E-A5A4-4C48-9DC6-1398BB032835}"/>
-    <dgm:cxn modelId="{1DF58AA6-2F7B-1F44-B344-5DEEEE7BB4B4}" type="presOf" srcId="{CB968AA7-A0F0-7849-A98E-3AB1ED405748}" destId="{A8DD5329-0D29-AB4F-A521-4316282862AA}" srcOrd="0" destOrd="0" presId="urn:microsoft.com/office/officeart/2005/8/layout/vList5"/>
-    <dgm:cxn modelId="{3B8DC5C3-EC87-F941-A72D-9A30499FAFC6}" srcId="{CB968AA7-A0F0-7849-A98E-3AB1ED405748}" destId="{1984CDB9-C88D-D64C-98E1-B35216583223}" srcOrd="1" destOrd="0" parTransId="{CB80B3B7-19A0-D749-A0D5-E4080788BC0F}" sibTransId="{2504D7FE-D27C-8348-81AC-601BCAF0DFA2}"/>
-    <dgm:cxn modelId="{F8D04A26-97CB-5A49-8300-341CABF3A18D}" type="presOf" srcId="{93B5EA41-DF56-3544-AF1D-0A6D797FABB2}" destId="{781948CB-D9F7-4443-871B-6B18B4B6922E}" srcOrd="0" destOrd="0" presId="urn:microsoft.com/office/officeart/2005/8/layout/vList5"/>
-    <dgm:cxn modelId="{F6CB3A92-A836-2941-842D-E4B96C91709C}" srcId="{CB968AA7-A0F0-7849-A98E-3AB1ED405748}" destId="{266FFF07-B2A8-9C4C-88CB-4658BCA3A018}" srcOrd="4" destOrd="0" parTransId="{C314E39A-630D-2348-A157-DB2A5D61240A}" sibTransId="{C5616DE3-FE5B-2747-80BB-2C172EBDDF13}"/>
     <dgm:cxn modelId="{0776ECF5-864F-3F4C-93E2-B09392B47ACA}" type="presOf" srcId="{4609A046-3EC9-924B-935A-1F33756DFFF3}" destId="{0B4916DB-3161-5546-AD61-9ACC05786C02}" srcOrd="0" destOrd="0" presId="urn:microsoft.com/office/officeart/2005/8/layout/vList5"/>
-    <dgm:cxn modelId="{5C5C7041-0AC5-8142-A5B0-E36256EFDFAD}" srcId="{CB968AA7-A0F0-7849-A98E-3AB1ED405748}" destId="{ED3848B3-A553-724A-A8BC-28D563889BD9}" srcOrd="2" destOrd="0" parTransId="{DF2CA930-F783-C040-90A3-2D4F656B34B5}" sibTransId="{CB505585-1108-BC49-B14F-968AD0F5EB5C}"/>
-    <dgm:cxn modelId="{61DB3D33-5266-E840-BCAB-3E1E0D124FBF}" type="presOf" srcId="{BB77D17A-F4CA-9A4B-A516-2D24F5790554}" destId="{1702FCD9-D775-A94E-92E3-DD87DC8891C9}" srcOrd="0" destOrd="0" presId="urn:microsoft.com/office/officeart/2005/8/layout/vList5"/>
     <dgm:cxn modelId="{F08894BD-FBA9-B641-A5E5-9808F03A3910}" type="presOf" srcId="{45CF5A76-FFF8-7E4E-8EB6-A77A9EAA0B78}" destId="{1B0D7DE3-1F6B-3347-AD49-DB022117B91C}" srcOrd="0" destOrd="0" presId="urn:microsoft.com/office/officeart/2005/8/layout/vList5"/>
     <dgm:cxn modelId="{08AF0437-A1D1-DF43-8D23-355C89FE7144}" srcId="{ED3848B3-A553-724A-A8BC-28D563889BD9}" destId="{371C76BF-8924-8F4E-9B48-30D0BA4B2ECD}" srcOrd="0" destOrd="0" parTransId="{18A1EB88-5F99-4145-8528-5A8C5E8588AE}" sibTransId="{EE350257-ACF1-EB4E-AB53-D93F95E6086E}"/>
+    <dgm:cxn modelId="{5DC9B8A0-DF56-704F-8795-BB6AD6D7D289}" srcId="{266FFF07-B2A8-9C4C-88CB-4658BCA3A018}" destId="{D5D06D43-A94F-994A-B2B2-6392790ABA4A}" srcOrd="0" destOrd="0" parTransId="{8D786B22-ED86-5E40-AFF7-3647F31EEF50}" sibTransId="{A404CE33-2FE9-C441-98FE-CC5D32003AE9}"/>
+    <dgm:cxn modelId="{816F60D1-7A89-504D-8A7E-5901D4674743}" type="presOf" srcId="{371C76BF-8924-8F4E-9B48-30D0BA4B2ECD}" destId="{C90EDB04-0A65-9C4A-82E0-4BF03DAE181D}" srcOrd="0" destOrd="0" presId="urn:microsoft.com/office/officeart/2005/8/layout/vList5"/>
+    <dgm:cxn modelId="{61DB3D33-5266-E840-BCAB-3E1E0D124FBF}" type="presOf" srcId="{BB77D17A-F4CA-9A4B-A516-2D24F5790554}" destId="{1702FCD9-D775-A94E-92E3-DD87DC8891C9}" srcOrd="0" destOrd="0" presId="urn:microsoft.com/office/officeart/2005/8/layout/vList5"/>
+    <dgm:cxn modelId="{7E98B93A-1696-0C42-AEBB-13A04D62B514}" type="presOf" srcId="{18801611-42AA-FB46-B87D-9781A7FFF6FB}" destId="{DF1164C9-0FC7-FD41-8B69-DFEAC9313CD5}" srcOrd="0" destOrd="0" presId="urn:microsoft.com/office/officeart/2005/8/layout/vList5"/>
+    <dgm:cxn modelId="{3B8DC5C3-EC87-F941-A72D-9A30499FAFC6}" srcId="{CB968AA7-A0F0-7849-A98E-3AB1ED405748}" destId="{1984CDB9-C88D-D64C-98E1-B35216583223}" srcOrd="1" destOrd="0" parTransId="{CB80B3B7-19A0-D749-A0D5-E4080788BC0F}" sibTransId="{2504D7FE-D27C-8348-81AC-601BCAF0DFA2}"/>
+    <dgm:cxn modelId="{E800DC21-CD4F-E64D-AB34-57F71E9CC30B}" srcId="{CB968AA7-A0F0-7849-A98E-3AB1ED405748}" destId="{A714FFC3-8131-5F4D-9502-BBB986CB1411}" srcOrd="5" destOrd="0" parTransId="{9720C7A9-4FCE-224C-962C-2840BAEE9A67}" sibTransId="{2590E8D7-8584-D54B-86AD-24E2B90A36FA}"/>
+    <dgm:cxn modelId="{257D9E96-94CA-0D44-9228-D3411418FD2F}" srcId="{A714FFC3-8131-5F4D-9502-BBB986CB1411}" destId="{93B5EA41-DF56-3544-AF1D-0A6D797FABB2}" srcOrd="0" destOrd="0" parTransId="{214D6756-A30F-A240-A027-8DD468DE7F1E}" sibTransId="{CF93A6CA-0E70-B245-994C-291C63CA60AF}"/>
+    <dgm:cxn modelId="{C988DB80-28FD-6542-A9CF-9C45EFCF6A02}" srcId="{18801611-42AA-FB46-B87D-9781A7FFF6FB}" destId="{45CF5A76-FFF8-7E4E-8EB6-A77A9EAA0B78}" srcOrd="0" destOrd="0" parTransId="{8C670C83-437B-3B4A-BFD5-361C1CCC01F4}" sibTransId="{DA6B1EF2-2B81-384E-A6B9-1A73BB2383DE}"/>
+    <dgm:cxn modelId="{2960B1C7-B185-1E49-B020-29B370EE6B9A}" srcId="{CB968AA7-A0F0-7849-A98E-3AB1ED405748}" destId="{18801611-42AA-FB46-B87D-9781A7FFF6FB}" srcOrd="0" destOrd="0" parTransId="{E228C804-6479-A248-8415-7BB3056AC2ED}" sibTransId="{993AD0A5-6517-704A-848C-67C8E8D12D33}"/>
+    <dgm:cxn modelId="{DDCD928B-D311-CC4A-82F8-88D8F876B0BA}" srcId="{D2FE5B7D-B367-4D43-9F19-8295E09075A4}" destId="{1773227D-C32F-BF4B-803A-95E0F7C1EE65}" srcOrd="0" destOrd="0" parTransId="{90BA1215-A93D-5947-8218-E90710F4B2B5}" sibTransId="{7DB5371F-C42A-D541-B1D6-291E9D578D7E}"/>
+    <dgm:cxn modelId="{28DD3188-7EDF-ED40-85F8-DF3E9A85CBC6}" type="presOf" srcId="{79B192F4-1BAD-F449-BD04-E7E785211C72}" destId="{D08EF089-5B23-CA4D-931F-98F96AF52F4A}" srcOrd="0" destOrd="0" presId="urn:microsoft.com/office/officeart/2005/8/layout/vList5"/>
+    <dgm:cxn modelId="{DF44CB31-544E-4246-85BB-6903531651FD}" type="presOf" srcId="{1984CDB9-C88D-D64C-98E1-B35216583223}" destId="{AD18DFAC-62D2-B84F-A3D0-C828D592C2D1}" srcOrd="0" destOrd="0" presId="urn:microsoft.com/office/officeart/2005/8/layout/vList5"/>
+    <dgm:cxn modelId="{5D537826-2D39-A942-B048-9C54C113D2B8}" type="presOf" srcId="{266FFF07-B2A8-9C4C-88CB-4658BCA3A018}" destId="{F710DE16-3D8C-2B43-A073-C7FE2C4E8D3C}" srcOrd="0" destOrd="0" presId="urn:microsoft.com/office/officeart/2005/8/layout/vList5"/>
+    <dgm:cxn modelId="{B1226E93-5C79-6946-B7F7-4C98DE1A5BB1}" type="presOf" srcId="{ED3848B3-A553-724A-A8BC-28D563889BD9}" destId="{2CB3C801-92E7-2343-B164-E40E55A17481}" srcOrd="0" destOrd="0" presId="urn:microsoft.com/office/officeart/2005/8/layout/vList5"/>
+    <dgm:cxn modelId="{F6CB3A92-A836-2941-842D-E4B96C91709C}" srcId="{CB968AA7-A0F0-7849-A98E-3AB1ED405748}" destId="{266FFF07-B2A8-9C4C-88CB-4658BCA3A018}" srcOrd="4" destOrd="0" parTransId="{C314E39A-630D-2348-A157-DB2A5D61240A}" sibTransId="{C5616DE3-FE5B-2747-80BB-2C172EBDDF13}"/>
+    <dgm:cxn modelId="{F8D04A26-97CB-5A49-8300-341CABF3A18D}" type="presOf" srcId="{93B5EA41-DF56-3544-AF1D-0A6D797FABB2}" destId="{781948CB-D9F7-4443-871B-6B18B4B6922E}" srcOrd="0" destOrd="0" presId="urn:microsoft.com/office/officeart/2005/8/layout/vList5"/>
+    <dgm:cxn modelId="{B03A56F7-2787-0A47-A4CB-BB104B84D5A4}" srcId="{CB968AA7-A0F0-7849-A98E-3AB1ED405748}" destId="{D2FE5B7D-B367-4D43-9F19-8295E09075A4}" srcOrd="3" destOrd="0" parTransId="{D9C48DBB-F5EF-2148-95AC-8819B7C76C2E}" sibTransId="{CE91648E-A5A4-4C48-9DC6-1398BB032835}"/>
+    <dgm:cxn modelId="{5C5C7041-0AC5-8142-A5B0-E36256EFDFAD}" srcId="{CB968AA7-A0F0-7849-A98E-3AB1ED405748}" destId="{ED3848B3-A553-724A-A8BC-28D563889BD9}" srcOrd="2" destOrd="0" parTransId="{DF2CA930-F783-C040-90A3-2D4F656B34B5}" sibTransId="{CB505585-1108-BC49-B14F-968AD0F5EB5C}"/>
+    <dgm:cxn modelId="{7AC65C92-D630-5641-AE43-9FFD825045CB}" srcId="{4609A046-3EC9-924B-935A-1F33756DFFF3}" destId="{BB77D17A-F4CA-9A4B-A516-2D24F5790554}" srcOrd="0" destOrd="0" parTransId="{2D35DED0-7E1E-6647-AFF9-753BA30BDECF}" sibTransId="{9A5AA540-A6B6-E54B-A9C2-3EA5B543C912}"/>
+    <dgm:cxn modelId="{A3B4ED6B-E65F-154D-867A-76DC0A3EF25B}" srcId="{1984CDB9-C88D-D64C-98E1-B35216583223}" destId="{79B192F4-1BAD-F449-BD04-E7E785211C72}" srcOrd="0" destOrd="0" parTransId="{5004FF52-0F6E-BD46-BCE9-F86B95B45A89}" sibTransId="{0F354A32-F033-E947-A137-FA1562654EA0}"/>
+    <dgm:cxn modelId="{AF81CF96-2B75-0B4D-AEDC-F4BA466D8D51}" type="presOf" srcId="{D2FE5B7D-B367-4D43-9F19-8295E09075A4}" destId="{48298BF1-FA06-4043-A56D-3DE269E997B0}" srcOrd="0" destOrd="0" presId="urn:microsoft.com/office/officeart/2005/8/layout/vList5"/>
+    <dgm:cxn modelId="{53B7F54A-9FDB-C54E-AA88-60CA35EE02B8}" type="presOf" srcId="{1773227D-C32F-BF4B-803A-95E0F7C1EE65}" destId="{0F86DD39-EDCD-0B47-A343-E17AB49E6EB5}" srcOrd="0" destOrd="0" presId="urn:microsoft.com/office/officeart/2005/8/layout/vList5"/>
+    <dgm:cxn modelId="{1DF58AA6-2F7B-1F44-B344-5DEEEE7BB4B4}" type="presOf" srcId="{CB968AA7-A0F0-7849-A98E-3AB1ED405748}" destId="{A8DD5329-0D29-AB4F-A521-4316282862AA}" srcOrd="0" destOrd="0" presId="urn:microsoft.com/office/officeart/2005/8/layout/vList5"/>
+    <dgm:cxn modelId="{89B35A46-4AC8-9D49-AA5B-99CFD11C1B59}" type="presOf" srcId="{D5D06D43-A94F-994A-B2B2-6392790ABA4A}" destId="{DDA6922B-5BC4-B541-A0CC-AE06C40993E8}" srcOrd="0" destOrd="0" presId="urn:microsoft.com/office/officeart/2005/8/layout/vList5"/>
+    <dgm:cxn modelId="{B0886C92-13C5-0C45-818B-91BEE380B349}" srcId="{CB968AA7-A0F0-7849-A98E-3AB1ED405748}" destId="{4609A046-3EC9-924B-935A-1F33756DFFF3}" srcOrd="6" destOrd="0" parTransId="{3D03FFE7-F42C-814D-9CF6-E3CF8E6362E4}" sibTransId="{9BFEB738-684B-4147-BF2F-9E88F09BA971}"/>
     <dgm:cxn modelId="{8517BDA8-357F-5944-A4A5-85E98C8735B0}" type="presParOf" srcId="{A8DD5329-0D29-AB4F-A521-4316282862AA}" destId="{B4F8BDE5-0F23-C44D-93DE-04AB60E91B43}" srcOrd="0" destOrd="0" presId="urn:microsoft.com/office/officeart/2005/8/layout/vList5"/>
     <dgm:cxn modelId="{EFB4E2C6-7816-AE48-A0CC-AE731EEA3A60}" type="presParOf" srcId="{B4F8BDE5-0F23-C44D-93DE-04AB60E91B43}" destId="{DF1164C9-0FC7-FD41-8B69-DFEAC9313CD5}" srcOrd="0" destOrd="0" presId="urn:microsoft.com/office/officeart/2005/8/layout/vList5"/>
     <dgm:cxn modelId="{A50F92AC-902D-E04E-95F9-BBBC47C0F68A}" type="presParOf" srcId="{B4F8BDE5-0F23-C44D-93DE-04AB60E91B43}" destId="{1B0D7DE3-1F6B-3347-AD49-DB022117B91C}" srcOrd="1" destOrd="0" presId="urn:microsoft.com/office/officeart/2005/8/layout/vList5"/>
@@ -12802,11 +12802,7 @@
           <a:p>
             <a:r>
               <a:rPr lang="en-US" dirty="0" smtClean="0"/>
-              <a:t>If there is no matching property, the body is </a:t>
-            </a:r>
-            <a:r>
-              <a:rPr lang="en-US" dirty="0" smtClean="0"/>
-              <a:t>skipped</a:t>
+              <a:t>If there is no matching property, the body is skipped</a:t>
             </a:r>
           </a:p>
           <a:p>
@@ -19498,6 +19494,9 @@
             </a:r>
             <a:r>
               <a:rPr lang="en-US" sz="2000" dirty="0" smtClean="0">
+                <a:solidFill>
+                  <a:srgbClr val="FF0000"/>
+                </a:solidFill>
                 <a:latin typeface="Monaco"/>
               </a:rPr>
               <a:t>{#property}</a:t>
@@ -19510,8 +19509,13 @@
           <a:p>
             <a:r>
               <a:rPr lang="en-US" dirty="0" smtClean="0"/>
-              <a:t>The name can be any valid JavaScript name</a:t>
-            </a:r>
+              <a:t>The name can be any valid JavaScript </a:t>
+            </a:r>
+            <a:r>
+              <a:rPr lang="en-US" dirty="0" smtClean="0"/>
+              <a:t>name.  Creates a local variable with that name.</a:t>
+            </a:r>
+            <a:endParaRPr lang="en-US" dirty="0" smtClean="0"/>
           </a:p>
           <a:p>
             <a:r>
@@ -19522,7 +19526,15 @@
           <a:p>
             <a:r>
               <a:rPr lang="en-US" dirty="0" smtClean="0"/>
-              <a:t>Typically used when the parent context and the child context have variable of </a:t>
+              <a:t>Typically used when the parent context and the child context have </a:t>
+            </a:r>
+            <a:r>
+              <a:rPr lang="en-US" dirty="0" smtClean="0"/>
+              <a:t>variables </a:t>
+            </a:r>
+            <a:r>
+              <a:rPr lang="en-US" dirty="0" smtClean="0"/>
+              <a:t>of </a:t>
             </a:r>
             <a:r>
               <a:rPr lang="en-US" dirty="0" smtClean="0">
@@ -19555,7 +19567,11 @@
               <a:t>{#child </a:t>
             </a:r>
             <a:r>
-              <a:rPr lang="en-US" dirty="0" err="1" smtClean="0"/>
+              <a:rPr lang="en-US" dirty="0" err="1" smtClean="0">
+                <a:solidFill>
+                  <a:srgbClr val="FF0000"/>
+                </a:solidFill>
+              </a:rPr>
               <a:t>parentId</a:t>
             </a:r>
             <a:r>
@@ -19572,7 +19588,11 @@
               <a:t>Parent id is {</a:t>
             </a:r>
             <a:r>
-              <a:rPr lang="en-US" dirty="0" err="1" smtClean="0"/>
+              <a:rPr lang="en-US" dirty="0" err="1" smtClean="0">
+                <a:solidFill>
+                  <a:srgbClr val="FF0000"/>
+                </a:solidFill>
+              </a:rPr>
               <a:t>parentId</a:t>
             </a:r>
             <a:r>
@@ -19619,7 +19639,7 @@
           <a:p>
             <a:r>
               <a:rPr lang="en-US" dirty="0" smtClean="0"/>
-              <a:t>Parameters</a:t>
+              <a:t>Parameters – Temporary Variables</a:t>
             </a:r>
             <a:endParaRPr lang="en-US" dirty="0"/>
           </a:p>
@@ -25225,24 +25245,11 @@
               <a:rPr lang="en-US" dirty="0" smtClean="0"/>
               <a:t>tag.  This defines the master</a:t>
             </a:r>
-            <a:endParaRPr lang="en-US" dirty="0" smtClean="0"/>
           </a:p>
           <a:p>
             <a:r>
               <a:rPr lang="en-US" dirty="0" smtClean="0"/>
-              <a:t>Partials </a:t>
-            </a:r>
-            <a:r>
-              <a:rPr lang="en-US" dirty="0" smtClean="0"/>
-              <a:t>can be referenced with a path but the name must be </a:t>
-            </a:r>
-            <a:r>
-              <a:rPr lang="en-US" dirty="0" smtClean="0"/>
-              <a:t>enclosed </a:t>
-            </a:r>
-            <a:r>
-              <a:rPr lang="en-US" dirty="0" smtClean="0"/>
-              <a:t>in double quotes: </a:t>
+              <a:t>Partials can be referenced with a path but the name must be enclosed in double quotes: </a:t>
             </a:r>
             <a:r>
               <a:rPr lang="en-US" dirty="0" smtClean="0">
@@ -25671,11 +25678,7 @@
             <a:pPr lvl="1"/>
             <a:r>
               <a:rPr lang="en-US" dirty="0" smtClean="0"/>
-              <a:t>{= </a:t>
-            </a:r>
-            <a:r>
-              <a:rPr lang="en-US" dirty="0" smtClean="0"/>
-              <a:t>$</a:t>
+              <a:t>{= $</a:t>
             </a:r>
             <a:r>
               <a:rPr lang="en-US" dirty="0" err="1" smtClean="0"/>
@@ -25713,77 +25716,83 @@
             <a:pPr lvl="1"/>
             <a:r>
               <a:rPr lang="en-US" dirty="0" smtClean="0">
+                <a:solidFill>
+                  <a:srgbClr val="FF0000"/>
+                </a:solidFill>
                 <a:sym typeface="Wingdings"/>
               </a:rPr>
               <a:t>{@math key=$</a:t>
+            </a:r>
+            <a:r>
+              <a:rPr lang="en-US" dirty="0" err="1" smtClean="0">
+                <a:solidFill>
+                  <a:srgbClr val="FF0000"/>
+                </a:solidFill>
+                <a:sym typeface="Wingdings"/>
+              </a:rPr>
+              <a:t>idx</a:t>
+            </a:r>
+            <a:r>
+              <a:rPr lang="en-US" dirty="0" smtClean="0">
+                <a:solidFill>
+                  <a:srgbClr val="FF0000"/>
+                </a:solidFill>
+                <a:sym typeface="Wingdings"/>
+              </a:rPr>
+              <a:t> method=“add” operand=1 /}</a:t>
+            </a:r>
+          </a:p>
+          <a:p>
+            <a:r>
+              <a:rPr lang="en-US" dirty="0" smtClean="0">
+                <a:sym typeface="Wingdings"/>
+              </a:rPr>
+              <a:t>The designers wanted Dust to be “</a:t>
             </a:r>
             <a:r>
               <a:rPr lang="en-US" dirty="0" err="1" smtClean="0">
                 <a:sym typeface="Wingdings"/>
               </a:rPr>
-              <a:t>idx</a:t>
+              <a:t>logicless</a:t>
             </a:r>
             <a:r>
               <a:rPr lang="en-US" dirty="0" smtClean="0">
                 <a:sym typeface="Wingdings"/>
               </a:rPr>
-              <a:t> method=“add” operand=1 /}</a:t>
-            </a:r>
-          </a:p>
-          <a:p>
+              <a:t>” like most of the early </a:t>
+            </a:r>
+            <a:r>
+              <a:rPr lang="en-US" dirty="0" err="1" smtClean="0">
+                <a:sym typeface="Wingdings"/>
+              </a:rPr>
+              <a:t>templating</a:t>
+            </a:r>
             <a:r>
               <a:rPr lang="en-US" dirty="0" smtClean="0">
                 <a:sym typeface="Wingdings"/>
               </a:rPr>
-              <a:t>The designers wanted Dust to be “</a:t>
+              <a:t> language (asp, </a:t>
             </a:r>
             <a:r>
               <a:rPr lang="en-US" dirty="0" err="1" smtClean="0">
                 <a:sym typeface="Wingdings"/>
               </a:rPr>
-              <a:t>logicless</a:t>
+              <a:t>jsp</a:t>
             </a:r>
             <a:r>
               <a:rPr lang="en-US" dirty="0" smtClean="0">
                 <a:sym typeface="Wingdings"/>
               </a:rPr>
-              <a:t>” like most of the early </a:t>
-            </a:r>
-            <a:r>
-              <a:rPr lang="en-US" dirty="0" err="1" smtClean="0">
-                <a:sym typeface="Wingdings"/>
-              </a:rPr>
-              <a:t>templating</a:t>
-            </a:r>
+              <a:t>, etc.)</a:t>
+            </a:r>
+          </a:p>
+          <a:p>
             <a:r>
               <a:rPr lang="en-US" dirty="0" smtClean="0">
                 <a:sym typeface="Wingdings"/>
               </a:rPr>
-              <a:t> language (asp, </a:t>
-            </a:r>
-            <a:r>
-              <a:rPr lang="en-US" dirty="0" err="1" smtClean="0">
-                <a:sym typeface="Wingdings"/>
-              </a:rPr>
-              <a:t>jsp</a:t>
-            </a:r>
-            <a:r>
-              <a:rPr lang="en-US" dirty="0" smtClean="0">
-                <a:sym typeface="Wingdings"/>
-              </a:rPr>
-              <a:t>, etc.)</a:t>
-            </a:r>
-          </a:p>
-          <a:p>
-            <a:r>
-              <a:rPr lang="en-US" dirty="0" smtClean="0">
-                <a:sym typeface="Wingdings"/>
-              </a:rPr>
               <a:t>So they allowed “helpers” to dynamically add new tags</a:t>
             </a:r>
-            <a:endParaRPr lang="en-US" dirty="0" smtClean="0">
-              <a:sym typeface="Wingdings"/>
-            </a:endParaRPr>
           </a:p>
           <a:p>
             <a:pPr lvl="1"/>
@@ -30817,11 +30826,7 @@
           <a:p>
             <a:r>
               <a:rPr lang="en-US" dirty="0" smtClean="0"/>
-              <a:t>parameters is an object with the specified </a:t>
-            </a:r>
-            <a:r>
-              <a:rPr lang="en-US" dirty="0" smtClean="0"/>
-              <a:t>parameters</a:t>
+              <a:t>parameters is an object with the specified parameters</a:t>
             </a:r>
             <a:endParaRPr lang="en-US" dirty="0"/>
           </a:p>
@@ -30959,16 +30964,7 @@
                 </a:solidFill>
                 <a:latin typeface="Monaco"/>
               </a:rPr>
-              <a:t>  </a:t>
-            </a:r>
-            <a:r>
-              <a:rPr lang="en-US" sz="1800" dirty="0" smtClean="0">
-                <a:solidFill>
-                  <a:srgbClr val="262626"/>
-                </a:solidFill>
-                <a:latin typeface="Monaco"/>
-              </a:rPr>
-              <a:t>}</a:t>
+              <a:t>  }</a:t>
             </a:r>
           </a:p>
           <a:p>

</xml_diff>

<commit_message>
Added example of @eq used for the lab
Changed the lab to add the quiz and results to a kraken app

Changed the lab to add the quiz and results to a kraken app

Changed the lab to add the quiz and results to a kraken app

Changed the lab to add the quiz and results to a kraken app
</commit_message>
<xml_diff>
--- a/node/lesson-83-dustjs/dustjs.pptx
+++ b/node/lesson-83-dustjs/dustjs.pptx
@@ -5,10 +5,10 @@
     <p:sldMasterId id="2147483648" r:id="rId1"/>
   </p:sldMasterIdLst>
   <p:notesMasterIdLst>
-    <p:notesMasterId r:id="rId45"/>
+    <p:notesMasterId r:id="rId47"/>
   </p:notesMasterIdLst>
   <p:handoutMasterIdLst>
-    <p:handoutMasterId r:id="rId46"/>
+    <p:handoutMasterId r:id="rId48"/>
   </p:handoutMasterIdLst>
   <p:sldIdLst>
     <p:sldId id="298" r:id="rId2"/>
@@ -44,21 +44,23 @@
     <p:sldId id="330" r:id="rId32"/>
     <p:sldId id="332" r:id="rId33"/>
     <p:sldId id="357" r:id="rId34"/>
-    <p:sldId id="333" r:id="rId35"/>
-    <p:sldId id="334" r:id="rId36"/>
-    <p:sldId id="336" r:id="rId37"/>
-    <p:sldId id="337" r:id="rId38"/>
-    <p:sldId id="340" r:id="rId39"/>
-    <p:sldId id="341" r:id="rId40"/>
-    <p:sldId id="342" r:id="rId41"/>
-    <p:sldId id="343" r:id="rId42"/>
-    <p:sldId id="347" r:id="rId43"/>
-    <p:sldId id="348" r:id="rId44"/>
+    <p:sldId id="358" r:id="rId35"/>
+    <p:sldId id="333" r:id="rId36"/>
+    <p:sldId id="334" r:id="rId37"/>
+    <p:sldId id="336" r:id="rId38"/>
+    <p:sldId id="337" r:id="rId39"/>
+    <p:sldId id="360" r:id="rId40"/>
+    <p:sldId id="340" r:id="rId41"/>
+    <p:sldId id="341" r:id="rId42"/>
+    <p:sldId id="342" r:id="rId43"/>
+    <p:sldId id="343" r:id="rId44"/>
+    <p:sldId id="347" r:id="rId45"/>
+    <p:sldId id="348" r:id="rId46"/>
   </p:sldIdLst>
   <p:sldSz cx="9144000" cy="6858000" type="screen4x3"/>
   <p:notesSz cx="6858000" cy="9144000"/>
   <p:custDataLst>
-    <p:tags r:id="rId48"/>
+    <p:tags r:id="rId49"/>
   </p:custDataLst>
   <p:defaultTextStyle>
     <a:defPPr>
@@ -155,6 +157,71 @@
       </a:defRPr>
     </a:lvl9pPr>
   </p:defaultTextStyle>
+  <p:extLst>
+    <p:ext uri="{EFAFB233-063F-42B5-8137-9DF3F51BA10A}">
+      <p15:sldGuideLst xmlns:p15="http://schemas.microsoft.com/office/powerpoint/2012/main">
+        <p15:guide id="1" orient="horz" pos="4176">
+          <p15:clr>
+            <a:srgbClr val="A4A3A4"/>
+          </p15:clr>
+        </p15:guide>
+        <p15:guide id="2" orient="horz" pos="607">
+          <p15:clr>
+            <a:srgbClr val="A4A3A4"/>
+          </p15:clr>
+        </p15:guide>
+        <p15:guide id="3" orient="horz" pos="212">
+          <p15:clr>
+            <a:srgbClr val="A4A3A4"/>
+          </p15:clr>
+        </p15:guide>
+        <p15:guide id="4" orient="horz" pos="912">
+          <p15:clr>
+            <a:srgbClr val="A4A3A4"/>
+          </p15:clr>
+        </p15:guide>
+        <p15:guide id="5" orient="horz" pos="3969">
+          <p15:clr>
+            <a:srgbClr val="A4A3A4"/>
+          </p15:clr>
+        </p15:guide>
+        <p15:guide id="6" pos="1267">
+          <p15:clr>
+            <a:srgbClr val="A4A3A4"/>
+          </p15:clr>
+        </p15:guide>
+        <p15:guide id="7" pos="382">
+          <p15:clr>
+            <a:srgbClr val="A4A3A4"/>
+          </p15:clr>
+        </p15:guide>
+        <p15:guide id="8" pos="2880">
+          <p15:clr>
+            <a:srgbClr val="A4A3A4"/>
+          </p15:clr>
+        </p15:guide>
+        <p15:guide id="9" pos="5568">
+          <p15:clr>
+            <a:srgbClr val="A4A3A4"/>
+          </p15:clr>
+        </p15:guide>
+      </p15:sldGuideLst>
+    </p:ext>
+    <p:ext uri="{2D200454-40CA-4A62-9FC3-DE9A4176ACB9}">
+      <p15:notesGuideLst xmlns:p15="http://schemas.microsoft.com/office/powerpoint/2012/main">
+        <p15:guide id="1" orient="horz" pos="2880">
+          <p15:clr>
+            <a:srgbClr val="A4A3A4"/>
+          </p15:clr>
+        </p15:guide>
+        <p15:guide id="2" pos="2160">
+          <p15:clr>
+            <a:srgbClr val="A4A3A4"/>
+          </p15:clr>
+        </p15:guide>
+      </p15:notesGuideLst>
+    </p:ext>
+  </p:extLst>
 </p:presentation>
 </file>
 
@@ -2490,35 +2557,35 @@
     </dgm:pt>
   </dgm:ptLst>
   <dgm:cxnLst>
+    <dgm:cxn modelId="{A3B4ED6B-E65F-154D-867A-76DC0A3EF25B}" srcId="{1984CDB9-C88D-D64C-98E1-B35216583223}" destId="{79B192F4-1BAD-F449-BD04-E7E785211C72}" srcOrd="0" destOrd="0" parTransId="{5004FF52-0F6E-BD46-BCE9-F86B95B45A89}" sibTransId="{0F354A32-F033-E947-A137-FA1562654EA0}"/>
+    <dgm:cxn modelId="{B0886C92-13C5-0C45-818B-91BEE380B349}" srcId="{CB968AA7-A0F0-7849-A98E-3AB1ED405748}" destId="{4609A046-3EC9-924B-935A-1F33756DFFF3}" srcOrd="6" destOrd="0" parTransId="{3D03FFE7-F42C-814D-9CF6-E3CF8E6362E4}" sibTransId="{9BFEB738-684B-4147-BF2F-9E88F09BA971}"/>
+    <dgm:cxn modelId="{816F60D1-7A89-504D-8A7E-5901D4674743}" type="presOf" srcId="{371C76BF-8924-8F4E-9B48-30D0BA4B2ECD}" destId="{C90EDB04-0A65-9C4A-82E0-4BF03DAE181D}" srcOrd="0" destOrd="0" presId="urn:microsoft.com/office/officeart/2005/8/layout/vList5"/>
+    <dgm:cxn modelId="{5D537826-2D39-A942-B048-9C54C113D2B8}" type="presOf" srcId="{266FFF07-B2A8-9C4C-88CB-4658BCA3A018}" destId="{F710DE16-3D8C-2B43-A073-C7FE2C4E8D3C}" srcOrd="0" destOrd="0" presId="urn:microsoft.com/office/officeart/2005/8/layout/vList5"/>
+    <dgm:cxn modelId="{7AC65C92-D630-5641-AE43-9FFD825045CB}" srcId="{4609A046-3EC9-924B-935A-1F33756DFFF3}" destId="{BB77D17A-F4CA-9A4B-A516-2D24F5790554}" srcOrd="0" destOrd="0" parTransId="{2D35DED0-7E1E-6647-AFF9-753BA30BDECF}" sibTransId="{9A5AA540-A6B6-E54B-A9C2-3EA5B543C912}"/>
+    <dgm:cxn modelId="{C988DB80-28FD-6542-A9CF-9C45EFCF6A02}" srcId="{18801611-42AA-FB46-B87D-9781A7FFF6FB}" destId="{45CF5A76-FFF8-7E4E-8EB6-A77A9EAA0B78}" srcOrd="0" destOrd="0" parTransId="{8C670C83-437B-3B4A-BFD5-361C1CCC01F4}" sibTransId="{DA6B1EF2-2B81-384E-A6B9-1A73BB2383DE}"/>
+    <dgm:cxn modelId="{AF81CF96-2B75-0B4D-AEDC-F4BA466D8D51}" type="presOf" srcId="{D2FE5B7D-B367-4D43-9F19-8295E09075A4}" destId="{48298BF1-FA06-4043-A56D-3DE269E997B0}" srcOrd="0" destOrd="0" presId="urn:microsoft.com/office/officeart/2005/8/layout/vList5"/>
+    <dgm:cxn modelId="{E800DC21-CD4F-E64D-AB34-57F71E9CC30B}" srcId="{CB968AA7-A0F0-7849-A98E-3AB1ED405748}" destId="{A714FFC3-8131-5F4D-9502-BBB986CB1411}" srcOrd="5" destOrd="0" parTransId="{9720C7A9-4FCE-224C-962C-2840BAEE9A67}" sibTransId="{2590E8D7-8584-D54B-86AD-24E2B90A36FA}"/>
+    <dgm:cxn modelId="{89B35A46-4AC8-9D49-AA5B-99CFD11C1B59}" type="presOf" srcId="{D5D06D43-A94F-994A-B2B2-6392790ABA4A}" destId="{DDA6922B-5BC4-B541-A0CC-AE06C40993E8}" srcOrd="0" destOrd="0" presId="urn:microsoft.com/office/officeart/2005/8/layout/vList5"/>
+    <dgm:cxn modelId="{5DC9B8A0-DF56-704F-8795-BB6AD6D7D289}" srcId="{266FFF07-B2A8-9C4C-88CB-4658BCA3A018}" destId="{D5D06D43-A94F-994A-B2B2-6392790ABA4A}" srcOrd="0" destOrd="0" parTransId="{8D786B22-ED86-5E40-AFF7-3647F31EEF50}" sibTransId="{A404CE33-2FE9-C441-98FE-CC5D32003AE9}"/>
+    <dgm:cxn modelId="{28DD3188-7EDF-ED40-85F8-DF3E9A85CBC6}" type="presOf" srcId="{79B192F4-1BAD-F449-BD04-E7E785211C72}" destId="{D08EF089-5B23-CA4D-931F-98F96AF52F4A}" srcOrd="0" destOrd="0" presId="urn:microsoft.com/office/officeart/2005/8/layout/vList5"/>
+    <dgm:cxn modelId="{B1226E93-5C79-6946-B7F7-4C98DE1A5BB1}" type="presOf" srcId="{ED3848B3-A553-724A-A8BC-28D563889BD9}" destId="{2CB3C801-92E7-2343-B164-E40E55A17481}" srcOrd="0" destOrd="0" presId="urn:microsoft.com/office/officeart/2005/8/layout/vList5"/>
+    <dgm:cxn modelId="{53B7F54A-9FDB-C54E-AA88-60CA35EE02B8}" type="presOf" srcId="{1773227D-C32F-BF4B-803A-95E0F7C1EE65}" destId="{0F86DD39-EDCD-0B47-A343-E17AB49E6EB5}" srcOrd="0" destOrd="0" presId="urn:microsoft.com/office/officeart/2005/8/layout/vList5"/>
+    <dgm:cxn modelId="{DDCD928B-D311-CC4A-82F8-88D8F876B0BA}" srcId="{D2FE5B7D-B367-4D43-9F19-8295E09075A4}" destId="{1773227D-C32F-BF4B-803A-95E0F7C1EE65}" srcOrd="0" destOrd="0" parTransId="{90BA1215-A93D-5947-8218-E90710F4B2B5}" sibTransId="{7DB5371F-C42A-D541-B1D6-291E9D578D7E}"/>
+    <dgm:cxn modelId="{7E98B93A-1696-0C42-AEBB-13A04D62B514}" type="presOf" srcId="{18801611-42AA-FB46-B87D-9781A7FFF6FB}" destId="{DF1164C9-0FC7-FD41-8B69-DFEAC9313CD5}" srcOrd="0" destOrd="0" presId="urn:microsoft.com/office/officeart/2005/8/layout/vList5"/>
+    <dgm:cxn modelId="{2960B1C7-B185-1E49-B020-29B370EE6B9A}" srcId="{CB968AA7-A0F0-7849-A98E-3AB1ED405748}" destId="{18801611-42AA-FB46-B87D-9781A7FFF6FB}" srcOrd="0" destOrd="0" parTransId="{E228C804-6479-A248-8415-7BB3056AC2ED}" sibTransId="{993AD0A5-6517-704A-848C-67C8E8D12D33}"/>
+    <dgm:cxn modelId="{257D9E96-94CA-0D44-9228-D3411418FD2F}" srcId="{A714FFC3-8131-5F4D-9502-BBB986CB1411}" destId="{93B5EA41-DF56-3544-AF1D-0A6D797FABB2}" srcOrd="0" destOrd="0" parTransId="{214D6756-A30F-A240-A027-8DD468DE7F1E}" sibTransId="{CF93A6CA-0E70-B245-994C-291C63CA60AF}"/>
     <dgm:cxn modelId="{E1245178-F402-724A-9550-3F49542B05E4}" type="presOf" srcId="{A714FFC3-8131-5F4D-9502-BBB986CB1411}" destId="{475D90FA-3621-9248-AAC8-A565E6B10834}" srcOrd="0" destOrd="0" presId="urn:microsoft.com/office/officeart/2005/8/layout/vList5"/>
+    <dgm:cxn modelId="{DF44CB31-544E-4246-85BB-6903531651FD}" type="presOf" srcId="{1984CDB9-C88D-D64C-98E1-B35216583223}" destId="{AD18DFAC-62D2-B84F-A3D0-C828D592C2D1}" srcOrd="0" destOrd="0" presId="urn:microsoft.com/office/officeart/2005/8/layout/vList5"/>
+    <dgm:cxn modelId="{B03A56F7-2787-0A47-A4CB-BB104B84D5A4}" srcId="{CB968AA7-A0F0-7849-A98E-3AB1ED405748}" destId="{D2FE5B7D-B367-4D43-9F19-8295E09075A4}" srcOrd="3" destOrd="0" parTransId="{D9C48DBB-F5EF-2148-95AC-8819B7C76C2E}" sibTransId="{CE91648E-A5A4-4C48-9DC6-1398BB032835}"/>
+    <dgm:cxn modelId="{1DF58AA6-2F7B-1F44-B344-5DEEEE7BB4B4}" type="presOf" srcId="{CB968AA7-A0F0-7849-A98E-3AB1ED405748}" destId="{A8DD5329-0D29-AB4F-A521-4316282862AA}" srcOrd="0" destOrd="0" presId="urn:microsoft.com/office/officeart/2005/8/layout/vList5"/>
+    <dgm:cxn modelId="{3B8DC5C3-EC87-F941-A72D-9A30499FAFC6}" srcId="{CB968AA7-A0F0-7849-A98E-3AB1ED405748}" destId="{1984CDB9-C88D-D64C-98E1-B35216583223}" srcOrd="1" destOrd="0" parTransId="{CB80B3B7-19A0-D749-A0D5-E4080788BC0F}" sibTransId="{2504D7FE-D27C-8348-81AC-601BCAF0DFA2}"/>
+    <dgm:cxn modelId="{F8D04A26-97CB-5A49-8300-341CABF3A18D}" type="presOf" srcId="{93B5EA41-DF56-3544-AF1D-0A6D797FABB2}" destId="{781948CB-D9F7-4443-871B-6B18B4B6922E}" srcOrd="0" destOrd="0" presId="urn:microsoft.com/office/officeart/2005/8/layout/vList5"/>
+    <dgm:cxn modelId="{F6CB3A92-A836-2941-842D-E4B96C91709C}" srcId="{CB968AA7-A0F0-7849-A98E-3AB1ED405748}" destId="{266FFF07-B2A8-9C4C-88CB-4658BCA3A018}" srcOrd="4" destOrd="0" parTransId="{C314E39A-630D-2348-A157-DB2A5D61240A}" sibTransId="{C5616DE3-FE5B-2747-80BB-2C172EBDDF13}"/>
     <dgm:cxn modelId="{0776ECF5-864F-3F4C-93E2-B09392B47ACA}" type="presOf" srcId="{4609A046-3EC9-924B-935A-1F33756DFFF3}" destId="{0B4916DB-3161-5546-AD61-9ACC05786C02}" srcOrd="0" destOrd="0" presId="urn:microsoft.com/office/officeart/2005/8/layout/vList5"/>
+    <dgm:cxn modelId="{5C5C7041-0AC5-8142-A5B0-E36256EFDFAD}" srcId="{CB968AA7-A0F0-7849-A98E-3AB1ED405748}" destId="{ED3848B3-A553-724A-A8BC-28D563889BD9}" srcOrd="2" destOrd="0" parTransId="{DF2CA930-F783-C040-90A3-2D4F656B34B5}" sibTransId="{CB505585-1108-BC49-B14F-968AD0F5EB5C}"/>
+    <dgm:cxn modelId="{61DB3D33-5266-E840-BCAB-3E1E0D124FBF}" type="presOf" srcId="{BB77D17A-F4CA-9A4B-A516-2D24F5790554}" destId="{1702FCD9-D775-A94E-92E3-DD87DC8891C9}" srcOrd="0" destOrd="0" presId="urn:microsoft.com/office/officeart/2005/8/layout/vList5"/>
     <dgm:cxn modelId="{F08894BD-FBA9-B641-A5E5-9808F03A3910}" type="presOf" srcId="{45CF5A76-FFF8-7E4E-8EB6-A77A9EAA0B78}" destId="{1B0D7DE3-1F6B-3347-AD49-DB022117B91C}" srcOrd="0" destOrd="0" presId="urn:microsoft.com/office/officeart/2005/8/layout/vList5"/>
     <dgm:cxn modelId="{08AF0437-A1D1-DF43-8D23-355C89FE7144}" srcId="{ED3848B3-A553-724A-A8BC-28D563889BD9}" destId="{371C76BF-8924-8F4E-9B48-30D0BA4B2ECD}" srcOrd="0" destOrd="0" parTransId="{18A1EB88-5F99-4145-8528-5A8C5E8588AE}" sibTransId="{EE350257-ACF1-EB4E-AB53-D93F95E6086E}"/>
-    <dgm:cxn modelId="{5DC9B8A0-DF56-704F-8795-BB6AD6D7D289}" srcId="{266FFF07-B2A8-9C4C-88CB-4658BCA3A018}" destId="{D5D06D43-A94F-994A-B2B2-6392790ABA4A}" srcOrd="0" destOrd="0" parTransId="{8D786B22-ED86-5E40-AFF7-3647F31EEF50}" sibTransId="{A404CE33-2FE9-C441-98FE-CC5D32003AE9}"/>
-    <dgm:cxn modelId="{816F60D1-7A89-504D-8A7E-5901D4674743}" type="presOf" srcId="{371C76BF-8924-8F4E-9B48-30D0BA4B2ECD}" destId="{C90EDB04-0A65-9C4A-82E0-4BF03DAE181D}" srcOrd="0" destOrd="0" presId="urn:microsoft.com/office/officeart/2005/8/layout/vList5"/>
-    <dgm:cxn modelId="{61DB3D33-5266-E840-BCAB-3E1E0D124FBF}" type="presOf" srcId="{BB77D17A-F4CA-9A4B-A516-2D24F5790554}" destId="{1702FCD9-D775-A94E-92E3-DD87DC8891C9}" srcOrd="0" destOrd="0" presId="urn:microsoft.com/office/officeart/2005/8/layout/vList5"/>
-    <dgm:cxn modelId="{7E98B93A-1696-0C42-AEBB-13A04D62B514}" type="presOf" srcId="{18801611-42AA-FB46-B87D-9781A7FFF6FB}" destId="{DF1164C9-0FC7-FD41-8B69-DFEAC9313CD5}" srcOrd="0" destOrd="0" presId="urn:microsoft.com/office/officeart/2005/8/layout/vList5"/>
-    <dgm:cxn modelId="{3B8DC5C3-EC87-F941-A72D-9A30499FAFC6}" srcId="{CB968AA7-A0F0-7849-A98E-3AB1ED405748}" destId="{1984CDB9-C88D-D64C-98E1-B35216583223}" srcOrd="1" destOrd="0" parTransId="{CB80B3B7-19A0-D749-A0D5-E4080788BC0F}" sibTransId="{2504D7FE-D27C-8348-81AC-601BCAF0DFA2}"/>
-    <dgm:cxn modelId="{E800DC21-CD4F-E64D-AB34-57F71E9CC30B}" srcId="{CB968AA7-A0F0-7849-A98E-3AB1ED405748}" destId="{A714FFC3-8131-5F4D-9502-BBB986CB1411}" srcOrd="5" destOrd="0" parTransId="{9720C7A9-4FCE-224C-962C-2840BAEE9A67}" sibTransId="{2590E8D7-8584-D54B-86AD-24E2B90A36FA}"/>
-    <dgm:cxn modelId="{257D9E96-94CA-0D44-9228-D3411418FD2F}" srcId="{A714FFC3-8131-5F4D-9502-BBB986CB1411}" destId="{93B5EA41-DF56-3544-AF1D-0A6D797FABB2}" srcOrd="0" destOrd="0" parTransId="{214D6756-A30F-A240-A027-8DD468DE7F1E}" sibTransId="{CF93A6CA-0E70-B245-994C-291C63CA60AF}"/>
-    <dgm:cxn modelId="{C988DB80-28FD-6542-A9CF-9C45EFCF6A02}" srcId="{18801611-42AA-FB46-B87D-9781A7FFF6FB}" destId="{45CF5A76-FFF8-7E4E-8EB6-A77A9EAA0B78}" srcOrd="0" destOrd="0" parTransId="{8C670C83-437B-3B4A-BFD5-361C1CCC01F4}" sibTransId="{DA6B1EF2-2B81-384E-A6B9-1A73BB2383DE}"/>
-    <dgm:cxn modelId="{2960B1C7-B185-1E49-B020-29B370EE6B9A}" srcId="{CB968AA7-A0F0-7849-A98E-3AB1ED405748}" destId="{18801611-42AA-FB46-B87D-9781A7FFF6FB}" srcOrd="0" destOrd="0" parTransId="{E228C804-6479-A248-8415-7BB3056AC2ED}" sibTransId="{993AD0A5-6517-704A-848C-67C8E8D12D33}"/>
-    <dgm:cxn modelId="{DDCD928B-D311-CC4A-82F8-88D8F876B0BA}" srcId="{D2FE5B7D-B367-4D43-9F19-8295E09075A4}" destId="{1773227D-C32F-BF4B-803A-95E0F7C1EE65}" srcOrd="0" destOrd="0" parTransId="{90BA1215-A93D-5947-8218-E90710F4B2B5}" sibTransId="{7DB5371F-C42A-D541-B1D6-291E9D578D7E}"/>
-    <dgm:cxn modelId="{28DD3188-7EDF-ED40-85F8-DF3E9A85CBC6}" type="presOf" srcId="{79B192F4-1BAD-F449-BD04-E7E785211C72}" destId="{D08EF089-5B23-CA4D-931F-98F96AF52F4A}" srcOrd="0" destOrd="0" presId="urn:microsoft.com/office/officeart/2005/8/layout/vList5"/>
-    <dgm:cxn modelId="{DF44CB31-544E-4246-85BB-6903531651FD}" type="presOf" srcId="{1984CDB9-C88D-D64C-98E1-B35216583223}" destId="{AD18DFAC-62D2-B84F-A3D0-C828D592C2D1}" srcOrd="0" destOrd="0" presId="urn:microsoft.com/office/officeart/2005/8/layout/vList5"/>
-    <dgm:cxn modelId="{5D537826-2D39-A942-B048-9C54C113D2B8}" type="presOf" srcId="{266FFF07-B2A8-9C4C-88CB-4658BCA3A018}" destId="{F710DE16-3D8C-2B43-A073-C7FE2C4E8D3C}" srcOrd="0" destOrd="0" presId="urn:microsoft.com/office/officeart/2005/8/layout/vList5"/>
-    <dgm:cxn modelId="{B1226E93-5C79-6946-B7F7-4C98DE1A5BB1}" type="presOf" srcId="{ED3848B3-A553-724A-A8BC-28D563889BD9}" destId="{2CB3C801-92E7-2343-B164-E40E55A17481}" srcOrd="0" destOrd="0" presId="urn:microsoft.com/office/officeart/2005/8/layout/vList5"/>
-    <dgm:cxn modelId="{F6CB3A92-A836-2941-842D-E4B96C91709C}" srcId="{CB968AA7-A0F0-7849-A98E-3AB1ED405748}" destId="{266FFF07-B2A8-9C4C-88CB-4658BCA3A018}" srcOrd="4" destOrd="0" parTransId="{C314E39A-630D-2348-A157-DB2A5D61240A}" sibTransId="{C5616DE3-FE5B-2747-80BB-2C172EBDDF13}"/>
-    <dgm:cxn modelId="{F8D04A26-97CB-5A49-8300-341CABF3A18D}" type="presOf" srcId="{93B5EA41-DF56-3544-AF1D-0A6D797FABB2}" destId="{781948CB-D9F7-4443-871B-6B18B4B6922E}" srcOrd="0" destOrd="0" presId="urn:microsoft.com/office/officeart/2005/8/layout/vList5"/>
-    <dgm:cxn modelId="{B03A56F7-2787-0A47-A4CB-BB104B84D5A4}" srcId="{CB968AA7-A0F0-7849-A98E-3AB1ED405748}" destId="{D2FE5B7D-B367-4D43-9F19-8295E09075A4}" srcOrd="3" destOrd="0" parTransId="{D9C48DBB-F5EF-2148-95AC-8819B7C76C2E}" sibTransId="{CE91648E-A5A4-4C48-9DC6-1398BB032835}"/>
-    <dgm:cxn modelId="{5C5C7041-0AC5-8142-A5B0-E36256EFDFAD}" srcId="{CB968AA7-A0F0-7849-A98E-3AB1ED405748}" destId="{ED3848B3-A553-724A-A8BC-28D563889BD9}" srcOrd="2" destOrd="0" parTransId="{DF2CA930-F783-C040-90A3-2D4F656B34B5}" sibTransId="{CB505585-1108-BC49-B14F-968AD0F5EB5C}"/>
-    <dgm:cxn modelId="{7AC65C92-D630-5641-AE43-9FFD825045CB}" srcId="{4609A046-3EC9-924B-935A-1F33756DFFF3}" destId="{BB77D17A-F4CA-9A4B-A516-2D24F5790554}" srcOrd="0" destOrd="0" parTransId="{2D35DED0-7E1E-6647-AFF9-753BA30BDECF}" sibTransId="{9A5AA540-A6B6-E54B-A9C2-3EA5B543C912}"/>
-    <dgm:cxn modelId="{A3B4ED6B-E65F-154D-867A-76DC0A3EF25B}" srcId="{1984CDB9-C88D-D64C-98E1-B35216583223}" destId="{79B192F4-1BAD-F449-BD04-E7E785211C72}" srcOrd="0" destOrd="0" parTransId="{5004FF52-0F6E-BD46-BCE9-F86B95B45A89}" sibTransId="{0F354A32-F033-E947-A137-FA1562654EA0}"/>
-    <dgm:cxn modelId="{AF81CF96-2B75-0B4D-AEDC-F4BA466D8D51}" type="presOf" srcId="{D2FE5B7D-B367-4D43-9F19-8295E09075A4}" destId="{48298BF1-FA06-4043-A56D-3DE269E997B0}" srcOrd="0" destOrd="0" presId="urn:microsoft.com/office/officeart/2005/8/layout/vList5"/>
-    <dgm:cxn modelId="{53B7F54A-9FDB-C54E-AA88-60CA35EE02B8}" type="presOf" srcId="{1773227D-C32F-BF4B-803A-95E0F7C1EE65}" destId="{0F86DD39-EDCD-0B47-A343-E17AB49E6EB5}" srcOrd="0" destOrd="0" presId="urn:microsoft.com/office/officeart/2005/8/layout/vList5"/>
-    <dgm:cxn modelId="{1DF58AA6-2F7B-1F44-B344-5DEEEE7BB4B4}" type="presOf" srcId="{CB968AA7-A0F0-7849-A98E-3AB1ED405748}" destId="{A8DD5329-0D29-AB4F-A521-4316282862AA}" srcOrd="0" destOrd="0" presId="urn:microsoft.com/office/officeart/2005/8/layout/vList5"/>
-    <dgm:cxn modelId="{89B35A46-4AC8-9D49-AA5B-99CFD11C1B59}" type="presOf" srcId="{D5D06D43-A94F-994A-B2B2-6392790ABA4A}" destId="{DDA6922B-5BC4-B541-A0CC-AE06C40993E8}" srcOrd="0" destOrd="0" presId="urn:microsoft.com/office/officeart/2005/8/layout/vList5"/>
-    <dgm:cxn modelId="{B0886C92-13C5-0C45-818B-91BEE380B349}" srcId="{CB968AA7-A0F0-7849-A98E-3AB1ED405748}" destId="{4609A046-3EC9-924B-935A-1F33756DFFF3}" srcOrd="6" destOrd="0" parTransId="{3D03FFE7-F42C-814D-9CF6-E3CF8E6362E4}" sibTransId="{9BFEB738-684B-4147-BF2F-9E88F09BA971}"/>
     <dgm:cxn modelId="{8517BDA8-357F-5944-A4A5-85E98C8735B0}" type="presParOf" srcId="{A8DD5329-0D29-AB4F-A521-4316282862AA}" destId="{B4F8BDE5-0F23-C44D-93DE-04AB60E91B43}" srcOrd="0" destOrd="0" presId="urn:microsoft.com/office/officeart/2005/8/layout/vList5"/>
     <dgm:cxn modelId="{EFB4E2C6-7816-AE48-A0CC-AE731EEA3A60}" type="presParOf" srcId="{B4F8BDE5-0F23-C44D-93DE-04AB60E91B43}" destId="{DF1164C9-0FC7-FD41-8B69-DFEAC9313CD5}" srcOrd="0" destOrd="0" presId="urn:microsoft.com/office/officeart/2005/8/layout/vList5"/>
     <dgm:cxn modelId="{A50F92AC-902D-E04E-95F9-BBBC47C0F68A}" type="presParOf" srcId="{B4F8BDE5-0F23-C44D-93DE-04AB60E91B43}" destId="{1B0D7DE3-1F6B-3347-AD49-DB022117B91C}" srcOrd="1" destOrd="0" presId="urn:microsoft.com/office/officeart/2005/8/layout/vList5"/>
@@ -3477,12 +3544,12 @@
         </a:fontRef>
       </dsp:style>
       <dsp:txBody>
-        <a:bodyPr spcFirstLastPara="0" vert="horz" wrap="square" lIns="129540" tIns="64770" rIns="129540" bIns="64770" numCol="1" spcCol="1270" anchor="ctr" anchorCtr="0">
+        <a:bodyPr spcFirstLastPara="0" vert="horz" wrap="square" lIns="133350" tIns="66675" rIns="133350" bIns="66675" numCol="1" spcCol="1270" anchor="ctr" anchorCtr="0">
           <a:noAutofit/>
         </a:bodyPr>
         <a:lstStyle/>
         <a:p>
-          <a:pPr lvl="0" algn="ctr" defTabSz="1511300">
+          <a:pPr lvl="0" algn="ctr" defTabSz="1555750">
             <a:lnSpc>
               <a:spcPct val="90000"/>
             </a:lnSpc>
@@ -3494,10 +3561,10 @@
             </a:spcAft>
           </a:pPr>
           <a:r>
-            <a:rPr lang="en-US" sz="3400" kern="1200" dirty="0" smtClean="0"/>
+            <a:rPr lang="en-US" sz="3500" kern="1200" dirty="0" smtClean="0"/>
             <a:t>s</a:t>
           </a:r>
-          <a:endParaRPr lang="en-US" sz="3400" kern="1200" dirty="0"/>
+          <a:endParaRPr lang="en-US" sz="3500" kern="1200" dirty="0"/>
         </a:p>
       </dsp:txBody>
       <dsp:txXfrm>
@@ -3651,12 +3718,12 @@
         </a:fontRef>
       </dsp:style>
       <dsp:txBody>
-        <a:bodyPr spcFirstLastPara="0" vert="horz" wrap="square" lIns="129540" tIns="64770" rIns="129540" bIns="64770" numCol="1" spcCol="1270" anchor="ctr" anchorCtr="0">
+        <a:bodyPr spcFirstLastPara="0" vert="horz" wrap="square" lIns="133350" tIns="66675" rIns="133350" bIns="66675" numCol="1" spcCol="1270" anchor="ctr" anchorCtr="0">
           <a:noAutofit/>
         </a:bodyPr>
         <a:lstStyle/>
         <a:p>
-          <a:pPr lvl="0" algn="ctr" defTabSz="1511300">
+          <a:pPr lvl="0" algn="ctr" defTabSz="1555750">
             <a:lnSpc>
               <a:spcPct val="90000"/>
             </a:lnSpc>
@@ -3668,10 +3735,10 @@
             </a:spcAft>
           </a:pPr>
           <a:r>
-            <a:rPr lang="en-US" sz="3400" kern="1200" dirty="0" smtClean="0"/>
+            <a:rPr lang="en-US" sz="3500" kern="1200" dirty="0" smtClean="0"/>
             <a:t>h</a:t>
           </a:r>
-          <a:endParaRPr lang="en-US" sz="3400" kern="1200" dirty="0"/>
+          <a:endParaRPr lang="en-US" sz="3500" kern="1200" dirty="0"/>
         </a:p>
       </dsp:txBody>
       <dsp:txXfrm>
@@ -3825,12 +3892,12 @@
         </a:fontRef>
       </dsp:style>
       <dsp:txBody>
-        <a:bodyPr spcFirstLastPara="0" vert="horz" wrap="square" lIns="129540" tIns="64770" rIns="129540" bIns="64770" numCol="1" spcCol="1270" anchor="ctr" anchorCtr="0">
+        <a:bodyPr spcFirstLastPara="0" vert="horz" wrap="square" lIns="133350" tIns="66675" rIns="133350" bIns="66675" numCol="1" spcCol="1270" anchor="ctr" anchorCtr="0">
           <a:noAutofit/>
         </a:bodyPr>
         <a:lstStyle/>
         <a:p>
-          <a:pPr lvl="0" algn="ctr" defTabSz="1511300">
+          <a:pPr lvl="0" algn="ctr" defTabSz="1555750">
             <a:lnSpc>
               <a:spcPct val="90000"/>
             </a:lnSpc>
@@ -3842,10 +3909,10 @@
             </a:spcAft>
           </a:pPr>
           <a:r>
-            <a:rPr lang="en-US" sz="3400" kern="1200" dirty="0" smtClean="0"/>
+            <a:rPr lang="en-US" sz="3500" kern="1200" dirty="0" smtClean="0"/>
             <a:t>j</a:t>
           </a:r>
-          <a:endParaRPr lang="en-US" sz="3400" kern="1200" dirty="0"/>
+          <a:endParaRPr lang="en-US" sz="3500" kern="1200" dirty="0"/>
         </a:p>
       </dsp:txBody>
       <dsp:txXfrm>
@@ -4003,12 +4070,12 @@
         </a:fontRef>
       </dsp:style>
       <dsp:txBody>
-        <a:bodyPr spcFirstLastPara="0" vert="horz" wrap="square" lIns="129540" tIns="64770" rIns="129540" bIns="64770" numCol="1" spcCol="1270" anchor="ctr" anchorCtr="0">
+        <a:bodyPr spcFirstLastPara="0" vert="horz" wrap="square" lIns="133350" tIns="66675" rIns="133350" bIns="66675" numCol="1" spcCol="1270" anchor="ctr" anchorCtr="0">
           <a:noAutofit/>
         </a:bodyPr>
         <a:lstStyle/>
         <a:p>
-          <a:pPr lvl="0" algn="ctr" defTabSz="1511300">
+          <a:pPr lvl="0" algn="ctr" defTabSz="1555750">
             <a:lnSpc>
               <a:spcPct val="90000"/>
             </a:lnSpc>
@@ -4020,10 +4087,10 @@
             </a:spcAft>
           </a:pPr>
           <a:r>
-            <a:rPr lang="en-US" sz="3400" kern="1200" dirty="0" smtClean="0"/>
+            <a:rPr lang="en-US" sz="3500" kern="1200" dirty="0" smtClean="0"/>
             <a:t>u</a:t>
           </a:r>
-          <a:endParaRPr lang="en-US" sz="3400" kern="1200" dirty="0"/>
+          <a:endParaRPr lang="en-US" sz="3500" kern="1200" dirty="0"/>
         </a:p>
       </dsp:txBody>
       <dsp:txXfrm>
@@ -4181,12 +4248,12 @@
         </a:fontRef>
       </dsp:style>
       <dsp:txBody>
-        <a:bodyPr spcFirstLastPara="0" vert="horz" wrap="square" lIns="129540" tIns="64770" rIns="129540" bIns="64770" numCol="1" spcCol="1270" anchor="ctr" anchorCtr="0">
+        <a:bodyPr spcFirstLastPara="0" vert="horz" wrap="square" lIns="133350" tIns="66675" rIns="133350" bIns="66675" numCol="1" spcCol="1270" anchor="ctr" anchorCtr="0">
           <a:noAutofit/>
         </a:bodyPr>
         <a:lstStyle/>
         <a:p>
-          <a:pPr lvl="0" algn="ctr" defTabSz="1511300">
+          <a:pPr lvl="0" algn="ctr" defTabSz="1555750">
             <a:lnSpc>
               <a:spcPct val="90000"/>
             </a:lnSpc>
@@ -4198,10 +4265,10 @@
             </a:spcAft>
           </a:pPr>
           <a:r>
-            <a:rPr lang="en-US" sz="3400" kern="1200" dirty="0" err="1" smtClean="0"/>
+            <a:rPr lang="en-US" sz="3500" kern="1200" dirty="0" err="1" smtClean="0"/>
             <a:t>uc</a:t>
           </a:r>
-          <a:endParaRPr lang="en-US" sz="3400" kern="1200" dirty="0"/>
+          <a:endParaRPr lang="en-US" sz="3500" kern="1200" dirty="0"/>
         </a:p>
       </dsp:txBody>
       <dsp:txXfrm>
@@ -4359,12 +4426,12 @@
         </a:fontRef>
       </dsp:style>
       <dsp:txBody>
-        <a:bodyPr spcFirstLastPara="0" vert="horz" wrap="square" lIns="129540" tIns="64770" rIns="129540" bIns="64770" numCol="1" spcCol="1270" anchor="ctr" anchorCtr="0">
+        <a:bodyPr spcFirstLastPara="0" vert="horz" wrap="square" lIns="133350" tIns="66675" rIns="133350" bIns="66675" numCol="1" spcCol="1270" anchor="ctr" anchorCtr="0">
           <a:noAutofit/>
         </a:bodyPr>
         <a:lstStyle/>
         <a:p>
-          <a:pPr lvl="0" algn="ctr" defTabSz="1511300">
+          <a:pPr lvl="0" algn="ctr" defTabSz="1555750">
             <a:lnSpc>
               <a:spcPct val="90000"/>
             </a:lnSpc>
@@ -4376,10 +4443,10 @@
             </a:spcAft>
           </a:pPr>
           <a:r>
-            <a:rPr lang="en-US" sz="3400" kern="1200" dirty="0" err="1" smtClean="0"/>
+            <a:rPr lang="en-US" sz="3500" kern="1200" dirty="0" err="1" smtClean="0"/>
             <a:t>js</a:t>
           </a:r>
-          <a:endParaRPr lang="en-US" sz="3400" kern="1200" dirty="0"/>
+          <a:endParaRPr lang="en-US" sz="3500" kern="1200" dirty="0"/>
         </a:p>
       </dsp:txBody>
       <dsp:txXfrm>
@@ -4533,12 +4600,12 @@
         </a:fontRef>
       </dsp:style>
       <dsp:txBody>
-        <a:bodyPr spcFirstLastPara="0" vert="horz" wrap="square" lIns="129540" tIns="64770" rIns="129540" bIns="64770" numCol="1" spcCol="1270" anchor="ctr" anchorCtr="0">
+        <a:bodyPr spcFirstLastPara="0" vert="horz" wrap="square" lIns="133350" tIns="66675" rIns="133350" bIns="66675" numCol="1" spcCol="1270" anchor="ctr" anchorCtr="0">
           <a:noAutofit/>
         </a:bodyPr>
         <a:lstStyle/>
         <a:p>
-          <a:pPr lvl="0" algn="ctr" defTabSz="1511300">
+          <a:pPr lvl="0" algn="ctr" defTabSz="1555750">
             <a:lnSpc>
               <a:spcPct val="90000"/>
             </a:lnSpc>
@@ -4550,10 +4617,10 @@
             </a:spcAft>
           </a:pPr>
           <a:r>
-            <a:rPr lang="en-US" sz="3400" kern="1200" dirty="0" err="1" smtClean="0"/>
+            <a:rPr lang="en-US" sz="3500" kern="1200" dirty="0" err="1" smtClean="0"/>
             <a:t>jp</a:t>
           </a:r>
-          <a:endParaRPr lang="en-US" sz="3400" kern="1200" dirty="0"/>
+          <a:endParaRPr lang="en-US" sz="3500" kern="1200" dirty="0"/>
         </a:p>
       </dsp:txBody>
       <dsp:txXfrm>
@@ -4624,12 +4691,12 @@
         <a:fontRef idx="minor"/>
       </dsp:style>
       <dsp:txBody>
-        <a:bodyPr spcFirstLastPara="0" vert="horz" wrap="square" lIns="110490" tIns="55245" rIns="110490" bIns="55245" numCol="1" spcCol="1270" anchor="ctr" anchorCtr="0">
+        <a:bodyPr spcFirstLastPara="0" vert="horz" wrap="square" lIns="118110" tIns="59055" rIns="118110" bIns="59055" numCol="1" spcCol="1270" anchor="ctr" anchorCtr="0">
           <a:noAutofit/>
         </a:bodyPr>
         <a:lstStyle/>
         <a:p>
-          <a:pPr marL="285750" lvl="1" indent="-285750" algn="l" defTabSz="1289050">
+          <a:pPr marL="285750" lvl="1" indent="-285750" algn="l" defTabSz="1377950">
             <a:lnSpc>
               <a:spcPct val="90000"/>
             </a:lnSpc>
@@ -4642,10 +4709,10 @@
             <a:buChar char="••"/>
           </a:pPr>
           <a:r>
-            <a:rPr lang="en-US" sz="2900" kern="1200" dirty="0" smtClean="0"/>
+            <a:rPr lang="en-US" sz="3100" kern="1200" dirty="0" smtClean="0"/>
             <a:t>Equality</a:t>
           </a:r>
-          <a:endParaRPr lang="en-US" sz="2900" kern="1200" dirty="0"/>
+          <a:endParaRPr lang="en-US" sz="3100" kern="1200" dirty="0"/>
         </a:p>
       </dsp:txBody>
       <dsp:txXfrm rot="-5400000">
@@ -4719,12 +4786,12 @@
         </a:fontRef>
       </dsp:style>
       <dsp:txBody>
-        <a:bodyPr spcFirstLastPara="0" vert="horz" wrap="square" lIns="137160" tIns="68580" rIns="137160" bIns="68580" numCol="1" spcCol="1270" anchor="ctr" anchorCtr="0">
+        <a:bodyPr spcFirstLastPara="0" vert="horz" wrap="square" lIns="144780" tIns="72390" rIns="144780" bIns="72390" numCol="1" spcCol="1270" anchor="ctr" anchorCtr="0">
           <a:noAutofit/>
         </a:bodyPr>
         <a:lstStyle/>
         <a:p>
-          <a:pPr lvl="0" algn="ctr" defTabSz="1600200">
+          <a:pPr lvl="0" algn="ctr" defTabSz="1689100">
             <a:lnSpc>
               <a:spcPct val="90000"/>
             </a:lnSpc>
@@ -4736,10 +4803,10 @@
             </a:spcAft>
           </a:pPr>
           <a:r>
-            <a:rPr lang="en-US" sz="3600" kern="1200" dirty="0" err="1" smtClean="0"/>
+            <a:rPr lang="en-US" sz="3800" kern="1200" dirty="0" err="1" smtClean="0"/>
             <a:t>eq</a:t>
           </a:r>
-          <a:endParaRPr lang="en-US" sz="3600" kern="1200" dirty="0"/>
+          <a:endParaRPr lang="en-US" sz="3800" kern="1200" dirty="0"/>
         </a:p>
       </dsp:txBody>
       <dsp:txXfrm>
@@ -4798,12 +4865,12 @@
         <a:fontRef idx="minor"/>
       </dsp:style>
       <dsp:txBody>
-        <a:bodyPr spcFirstLastPara="0" vert="horz" wrap="square" lIns="110490" tIns="55245" rIns="110490" bIns="55245" numCol="1" spcCol="1270" anchor="ctr" anchorCtr="0">
+        <a:bodyPr spcFirstLastPara="0" vert="horz" wrap="square" lIns="118110" tIns="59055" rIns="118110" bIns="59055" numCol="1" spcCol="1270" anchor="ctr" anchorCtr="0">
           <a:noAutofit/>
         </a:bodyPr>
         <a:lstStyle/>
         <a:p>
-          <a:pPr marL="285750" lvl="1" indent="-285750" algn="l" defTabSz="1289050">
+          <a:pPr marL="285750" lvl="1" indent="-285750" algn="l" defTabSz="1377950">
             <a:lnSpc>
               <a:spcPct val="90000"/>
             </a:lnSpc>
@@ -4816,10 +4883,10 @@
             <a:buChar char="••"/>
           </a:pPr>
           <a:r>
-            <a:rPr lang="en-US" sz="2900" kern="1200" dirty="0" smtClean="0"/>
+            <a:rPr lang="en-US" sz="3100" kern="1200" dirty="0" smtClean="0"/>
             <a:t>Inequality</a:t>
           </a:r>
-          <a:endParaRPr lang="en-US" sz="2900" kern="1200" dirty="0"/>
+          <a:endParaRPr lang="en-US" sz="3100" kern="1200" dirty="0"/>
         </a:p>
       </dsp:txBody>
       <dsp:txXfrm rot="-5400000">
@@ -4893,12 +4960,12 @@
         </a:fontRef>
       </dsp:style>
       <dsp:txBody>
-        <a:bodyPr spcFirstLastPara="0" vert="horz" wrap="square" lIns="137160" tIns="68580" rIns="137160" bIns="68580" numCol="1" spcCol="1270" anchor="ctr" anchorCtr="0">
+        <a:bodyPr spcFirstLastPara="0" vert="horz" wrap="square" lIns="144780" tIns="72390" rIns="144780" bIns="72390" numCol="1" spcCol="1270" anchor="ctr" anchorCtr="0">
           <a:noAutofit/>
         </a:bodyPr>
         <a:lstStyle/>
         <a:p>
-          <a:pPr lvl="0" algn="ctr" defTabSz="1600200">
+          <a:pPr lvl="0" algn="ctr" defTabSz="1689100">
             <a:lnSpc>
               <a:spcPct val="90000"/>
             </a:lnSpc>
@@ -4910,10 +4977,10 @@
             </a:spcAft>
           </a:pPr>
           <a:r>
-            <a:rPr lang="en-US" sz="3600" kern="1200" dirty="0" smtClean="0"/>
+            <a:rPr lang="en-US" sz="3800" kern="1200" dirty="0" smtClean="0"/>
             <a:t>ne</a:t>
           </a:r>
-          <a:endParaRPr lang="en-US" sz="3600" kern="1200" dirty="0"/>
+          <a:endParaRPr lang="en-US" sz="3800" kern="1200" dirty="0"/>
         </a:p>
       </dsp:txBody>
       <dsp:txXfrm>
@@ -4972,12 +5039,12 @@
         <a:fontRef idx="minor"/>
       </dsp:style>
       <dsp:txBody>
-        <a:bodyPr spcFirstLastPara="0" vert="horz" wrap="square" lIns="110490" tIns="55245" rIns="110490" bIns="55245" numCol="1" spcCol="1270" anchor="ctr" anchorCtr="0">
+        <a:bodyPr spcFirstLastPara="0" vert="horz" wrap="square" lIns="118110" tIns="59055" rIns="118110" bIns="59055" numCol="1" spcCol="1270" anchor="ctr" anchorCtr="0">
           <a:noAutofit/>
         </a:bodyPr>
         <a:lstStyle/>
         <a:p>
-          <a:pPr marL="285750" lvl="1" indent="-285750" algn="l" defTabSz="1289050">
+          <a:pPr marL="285750" lvl="1" indent="-285750" algn="l" defTabSz="1377950">
             <a:lnSpc>
               <a:spcPct val="90000"/>
             </a:lnSpc>
@@ -4990,10 +5057,10 @@
             <a:buChar char="••"/>
           </a:pPr>
           <a:r>
-            <a:rPr lang="en-US" sz="2900" kern="1200" dirty="0" smtClean="0"/>
+            <a:rPr lang="en-US" sz="3100" kern="1200" dirty="0" smtClean="0"/>
             <a:t>Greater than</a:t>
           </a:r>
-          <a:endParaRPr lang="en-US" sz="2900" kern="1200" dirty="0"/>
+          <a:endParaRPr lang="en-US" sz="3100" kern="1200" dirty="0"/>
         </a:p>
       </dsp:txBody>
       <dsp:txXfrm rot="-5400000">
@@ -5067,12 +5134,12 @@
         </a:fontRef>
       </dsp:style>
       <dsp:txBody>
-        <a:bodyPr spcFirstLastPara="0" vert="horz" wrap="square" lIns="137160" tIns="68580" rIns="137160" bIns="68580" numCol="1" spcCol="1270" anchor="ctr" anchorCtr="0">
+        <a:bodyPr spcFirstLastPara="0" vert="horz" wrap="square" lIns="144780" tIns="72390" rIns="144780" bIns="72390" numCol="1" spcCol="1270" anchor="ctr" anchorCtr="0">
           <a:noAutofit/>
         </a:bodyPr>
         <a:lstStyle/>
         <a:p>
-          <a:pPr lvl="0" algn="ctr" defTabSz="1600200">
+          <a:pPr lvl="0" algn="ctr" defTabSz="1689100">
             <a:lnSpc>
               <a:spcPct val="90000"/>
             </a:lnSpc>
@@ -5084,10 +5151,10 @@
             </a:spcAft>
           </a:pPr>
           <a:r>
-            <a:rPr lang="en-US" sz="3600" kern="1200" dirty="0" err="1" smtClean="0"/>
+            <a:rPr lang="en-US" sz="3800" kern="1200" dirty="0" err="1" smtClean="0"/>
             <a:t>gt</a:t>
           </a:r>
-          <a:endParaRPr lang="en-US" sz="3600" kern="1200" dirty="0"/>
+          <a:endParaRPr lang="en-US" sz="3800" kern="1200" dirty="0"/>
         </a:p>
       </dsp:txBody>
       <dsp:txXfrm>
@@ -5146,12 +5213,12 @@
         <a:fontRef idx="minor"/>
       </dsp:style>
       <dsp:txBody>
-        <a:bodyPr spcFirstLastPara="0" vert="horz" wrap="square" lIns="110490" tIns="55245" rIns="110490" bIns="55245" numCol="1" spcCol="1270" anchor="ctr" anchorCtr="0">
+        <a:bodyPr spcFirstLastPara="0" vert="horz" wrap="square" lIns="118110" tIns="59055" rIns="118110" bIns="59055" numCol="1" spcCol="1270" anchor="ctr" anchorCtr="0">
           <a:noAutofit/>
         </a:bodyPr>
         <a:lstStyle/>
         <a:p>
-          <a:pPr marL="285750" lvl="1" indent="-285750" algn="l" defTabSz="1289050">
+          <a:pPr marL="285750" lvl="1" indent="-285750" algn="l" defTabSz="1377950">
             <a:lnSpc>
               <a:spcPct val="90000"/>
             </a:lnSpc>
@@ -5164,10 +5231,10 @@
             <a:buChar char="••"/>
           </a:pPr>
           <a:r>
-            <a:rPr lang="en-US" sz="2900" kern="1200" dirty="0" smtClean="0"/>
+            <a:rPr lang="en-US" sz="3100" kern="1200" dirty="0" smtClean="0"/>
             <a:t>Less than</a:t>
           </a:r>
-          <a:endParaRPr lang="en-US" sz="2900" kern="1200" dirty="0"/>
+          <a:endParaRPr lang="en-US" sz="3100" kern="1200" dirty="0"/>
         </a:p>
       </dsp:txBody>
       <dsp:txXfrm rot="-5400000">
@@ -5241,12 +5308,12 @@
         </a:fontRef>
       </dsp:style>
       <dsp:txBody>
-        <a:bodyPr spcFirstLastPara="0" vert="horz" wrap="square" lIns="137160" tIns="68580" rIns="137160" bIns="68580" numCol="1" spcCol="1270" anchor="ctr" anchorCtr="0">
+        <a:bodyPr spcFirstLastPara="0" vert="horz" wrap="square" lIns="144780" tIns="72390" rIns="144780" bIns="72390" numCol="1" spcCol="1270" anchor="ctr" anchorCtr="0">
           <a:noAutofit/>
         </a:bodyPr>
         <a:lstStyle/>
         <a:p>
-          <a:pPr lvl="0" algn="ctr" defTabSz="1600200">
+          <a:pPr lvl="0" algn="ctr" defTabSz="1689100">
             <a:lnSpc>
               <a:spcPct val="90000"/>
             </a:lnSpc>
@@ -5258,10 +5325,10 @@
             </a:spcAft>
           </a:pPr>
           <a:r>
-            <a:rPr lang="en-US" sz="3600" kern="1200" dirty="0" err="1" smtClean="0"/>
+            <a:rPr lang="en-US" sz="3800" kern="1200" dirty="0" err="1" smtClean="0"/>
             <a:t>lt</a:t>
           </a:r>
-          <a:endParaRPr lang="en-US" sz="3600" kern="1200" dirty="0"/>
+          <a:endParaRPr lang="en-US" sz="3800" kern="1200" dirty="0"/>
         </a:p>
       </dsp:txBody>
       <dsp:txXfrm>
@@ -5320,12 +5387,12 @@
         <a:fontRef idx="minor"/>
       </dsp:style>
       <dsp:txBody>
-        <a:bodyPr spcFirstLastPara="0" vert="horz" wrap="square" lIns="110490" tIns="55245" rIns="110490" bIns="55245" numCol="1" spcCol="1270" anchor="ctr" anchorCtr="0">
+        <a:bodyPr spcFirstLastPara="0" vert="horz" wrap="square" lIns="118110" tIns="59055" rIns="118110" bIns="59055" numCol="1" spcCol="1270" anchor="ctr" anchorCtr="0">
           <a:noAutofit/>
         </a:bodyPr>
         <a:lstStyle/>
         <a:p>
-          <a:pPr marL="285750" lvl="1" indent="-285750" algn="l" defTabSz="1289050">
+          <a:pPr marL="285750" lvl="1" indent="-285750" algn="l" defTabSz="1377950">
             <a:lnSpc>
               <a:spcPct val="90000"/>
             </a:lnSpc>
@@ -5338,10 +5405,10 @@
             <a:buChar char="••"/>
           </a:pPr>
           <a:r>
-            <a:rPr lang="en-US" sz="2900" kern="1200" dirty="0" smtClean="0"/>
+            <a:rPr lang="en-US" sz="3100" kern="1200" dirty="0" smtClean="0"/>
             <a:t>Greater than or equals</a:t>
           </a:r>
-          <a:endParaRPr lang="en-US" sz="2900" kern="1200" dirty="0"/>
+          <a:endParaRPr lang="en-US" sz="3100" kern="1200" dirty="0"/>
         </a:p>
       </dsp:txBody>
       <dsp:txXfrm rot="-5400000">
@@ -5415,12 +5482,12 @@
         </a:fontRef>
       </dsp:style>
       <dsp:txBody>
-        <a:bodyPr spcFirstLastPara="0" vert="horz" wrap="square" lIns="137160" tIns="68580" rIns="137160" bIns="68580" numCol="1" spcCol="1270" anchor="ctr" anchorCtr="0">
+        <a:bodyPr spcFirstLastPara="0" vert="horz" wrap="square" lIns="144780" tIns="72390" rIns="144780" bIns="72390" numCol="1" spcCol="1270" anchor="ctr" anchorCtr="0">
           <a:noAutofit/>
         </a:bodyPr>
         <a:lstStyle/>
         <a:p>
-          <a:pPr lvl="0" algn="ctr" defTabSz="1600200">
+          <a:pPr lvl="0" algn="ctr" defTabSz="1689100">
             <a:lnSpc>
               <a:spcPct val="90000"/>
             </a:lnSpc>
@@ -5432,10 +5499,10 @@
             </a:spcAft>
           </a:pPr>
           <a:r>
-            <a:rPr lang="en-US" sz="3600" kern="1200" dirty="0" err="1" smtClean="0"/>
+            <a:rPr lang="en-US" sz="3800" kern="1200" dirty="0" err="1" smtClean="0"/>
             <a:t>gte</a:t>
           </a:r>
-          <a:endParaRPr lang="en-US" sz="3600" kern="1200" dirty="0"/>
+          <a:endParaRPr lang="en-US" sz="3800" kern="1200" dirty="0"/>
         </a:p>
       </dsp:txBody>
       <dsp:txXfrm>
@@ -5494,12 +5561,12 @@
         <a:fontRef idx="minor"/>
       </dsp:style>
       <dsp:txBody>
-        <a:bodyPr spcFirstLastPara="0" vert="horz" wrap="square" lIns="110490" tIns="55245" rIns="110490" bIns="55245" numCol="1" spcCol="1270" anchor="ctr" anchorCtr="0">
+        <a:bodyPr spcFirstLastPara="0" vert="horz" wrap="square" lIns="118110" tIns="59055" rIns="118110" bIns="59055" numCol="1" spcCol="1270" anchor="ctr" anchorCtr="0">
           <a:noAutofit/>
         </a:bodyPr>
         <a:lstStyle/>
         <a:p>
-          <a:pPr marL="285750" lvl="1" indent="-285750" algn="l" defTabSz="1289050">
+          <a:pPr marL="285750" lvl="1" indent="-285750" algn="l" defTabSz="1377950">
             <a:lnSpc>
               <a:spcPct val="90000"/>
             </a:lnSpc>
@@ -5512,10 +5579,10 @@
             <a:buChar char="••"/>
           </a:pPr>
           <a:r>
-            <a:rPr lang="en-US" sz="2900" kern="1200" dirty="0" smtClean="0"/>
+            <a:rPr lang="en-US" sz="3100" kern="1200" dirty="0" smtClean="0"/>
             <a:t>Less than or equals</a:t>
           </a:r>
-          <a:endParaRPr lang="en-US" sz="2900" kern="1200" dirty="0"/>
+          <a:endParaRPr lang="en-US" sz="3100" kern="1200" dirty="0"/>
         </a:p>
       </dsp:txBody>
       <dsp:txXfrm rot="-5400000">
@@ -5589,12 +5656,12 @@
         </a:fontRef>
       </dsp:style>
       <dsp:txBody>
-        <a:bodyPr spcFirstLastPara="0" vert="horz" wrap="square" lIns="137160" tIns="68580" rIns="137160" bIns="68580" numCol="1" spcCol="1270" anchor="ctr" anchorCtr="0">
+        <a:bodyPr spcFirstLastPara="0" vert="horz" wrap="square" lIns="144780" tIns="72390" rIns="144780" bIns="72390" numCol="1" spcCol="1270" anchor="ctr" anchorCtr="0">
           <a:noAutofit/>
         </a:bodyPr>
         <a:lstStyle/>
         <a:p>
-          <a:pPr lvl="0" algn="ctr" defTabSz="1600200">
+          <a:pPr lvl="0" algn="ctr" defTabSz="1689100">
             <a:lnSpc>
               <a:spcPct val="90000"/>
             </a:lnSpc>
@@ -5606,10 +5673,10 @@
             </a:spcAft>
           </a:pPr>
           <a:r>
-            <a:rPr lang="en-US" sz="3600" kern="1200" dirty="0" err="1" smtClean="0"/>
+            <a:rPr lang="en-US" sz="3800" kern="1200" dirty="0" err="1" smtClean="0"/>
             <a:t>lte</a:t>
           </a:r>
-          <a:endParaRPr lang="en-US" sz="3600" kern="1200" dirty="0"/>
+          <a:endParaRPr lang="en-US" sz="3800" kern="1200" dirty="0"/>
         </a:p>
       </dsp:txBody>
       <dsp:txXfrm>
@@ -8834,7 +8901,7 @@
             <a:fld id="{6AFC80D5-740B-4CAF-B407-EC08971373CE}" type="slidenum">
               <a:rPr lang="en-US" smtClean="0"/>
               <a:pPr/>
-              <a:t>36</a:t>
+              <a:t>37</a:t>
             </a:fld>
             <a:endParaRPr lang="en-US" dirty="0"/>
           </a:p>
@@ -8927,7 +8994,7 @@
             <a:fld id="{6AFC80D5-740B-4CAF-B407-EC08971373CE}" type="slidenum">
               <a:rPr lang="en-US" smtClean="0"/>
               <a:pPr/>
-              <a:t>39</a:t>
+              <a:t>41</a:t>
             </a:fld>
             <a:endParaRPr lang="en-US" dirty="0"/>
           </a:p>
@@ -9012,7 +9079,7 @@
             <a:fld id="{6AFC80D5-740B-4CAF-B407-EC08971373CE}" type="slidenum">
               <a:rPr lang="en-US" smtClean="0"/>
               <a:pPr/>
-              <a:t>40</a:t>
+              <a:t>42</a:t>
             </a:fld>
             <a:endParaRPr lang="en-US" dirty="0"/>
           </a:p>
@@ -10131,7 +10198,7 @@
   <p:timing>
     <p:tnLst>
       <p:par>
-        <p:cTn xmlns:p14="http://schemas.microsoft.com/office/powerpoint/2010/main" id="1" dur="indefinite" restart="never" nodeType="tmRoot"/>
+        <p:cTn id="1" dur="indefinite" restart="never" nodeType="tmRoot"/>
       </p:par>
     </p:tnLst>
   </p:timing>
@@ -10187,7 +10254,7 @@
           <a:noFill/>
           <a:extLst>
             <a:ext uri="{909E8E84-426E-40dd-AFC4-6F175D3DCCD1}">
-              <a14:hiddenFill xmlns:a14="http://schemas.microsoft.com/office/drawing/2010/main">
+              <a14:hiddenFill xmlns:a14="http://schemas.microsoft.com/office/drawing/2010/main" xmlns="">
                 <a:solidFill>
                   <a:srgbClr val="FFFFFF"/>
                 </a:solidFill>
@@ -10342,7 +10409,7 @@
   <p:timing>
     <p:tnLst>
       <p:par>
-        <p:cTn xmlns:p14="http://schemas.microsoft.com/office/powerpoint/2010/main" id="1" dur="indefinite" restart="never" nodeType="tmRoot"/>
+        <p:cTn id="1" dur="indefinite" restart="never" nodeType="tmRoot"/>
       </p:par>
     </p:tnLst>
   </p:timing>
@@ -10797,7 +10864,7 @@
   <p:timing>
     <p:tnLst>
       <p:par>
-        <p:cTn xmlns:p14="http://schemas.microsoft.com/office/powerpoint/2010/main" id="1" dur="indefinite" restart="never" nodeType="tmRoot"/>
+        <p:cTn id="1" dur="indefinite" restart="never" nodeType="tmRoot"/>
       </p:par>
     </p:tnLst>
   </p:timing>
@@ -11137,7 +11204,7 @@
   <p:timing>
     <p:tnLst>
       <p:par>
-        <p:cTn xmlns:p14="http://schemas.microsoft.com/office/powerpoint/2010/main" id="1" dur="indefinite" restart="never" nodeType="tmRoot"/>
+        <p:cTn id="1" dur="indefinite" restart="never" nodeType="tmRoot"/>
       </p:par>
     </p:tnLst>
   </p:timing>
@@ -11625,7 +11692,7 @@
   <p:timing>
     <p:tnLst>
       <p:par>
-        <p:cTn xmlns:p14="http://schemas.microsoft.com/office/powerpoint/2010/main" id="1" dur="indefinite" restart="never" nodeType="tmRoot"/>
+        <p:cTn id="1" dur="indefinite" restart="never" nodeType="tmRoot"/>
       </p:par>
     </p:tnLst>
   </p:timing>
@@ -12000,7 +12067,7 @@
   <p:timing>
     <p:tnLst>
       <p:par>
-        <p:cTn xmlns:p14="http://schemas.microsoft.com/office/powerpoint/2010/main" id="1" dur="indefinite" restart="never" nodeType="tmRoot"/>
+        <p:cTn id="1" dur="indefinite" restart="never" nodeType="tmRoot"/>
       </p:par>
     </p:tnLst>
   </p:timing>
@@ -12178,7 +12245,7 @@
   <p:timing>
     <p:tnLst>
       <p:par>
-        <p:cTn xmlns:p14="http://schemas.microsoft.com/office/powerpoint/2010/main" id="1" dur="indefinite" restart="never" nodeType="tmRoot"/>
+        <p:cTn id="1" dur="indefinite" restart="never" nodeType="tmRoot"/>
       </p:par>
     </p:tnLst>
   </p:timing>
@@ -12467,7 +12534,7 @@
   <p:timing>
     <p:tnLst>
       <p:par>
-        <p:cTn xmlns:p14="http://schemas.microsoft.com/office/powerpoint/2010/main" id="1" dur="indefinite" restart="never" nodeType="tmRoot"/>
+        <p:cTn id="1" dur="indefinite" restart="never" nodeType="tmRoot"/>
       </p:par>
     </p:tnLst>
   </p:timing>
@@ -12677,7 +12744,7 @@
   <p:timing>
     <p:tnLst>
       <p:par>
-        <p:cTn xmlns:p14="http://schemas.microsoft.com/office/powerpoint/2010/main" id="1" dur="indefinite" restart="never" nodeType="tmRoot"/>
+        <p:cTn id="1" dur="indefinite" restart="never" nodeType="tmRoot"/>
       </p:par>
     </p:tnLst>
   </p:timing>
@@ -12905,7 +12972,7 @@
   <p:timing>
     <p:tnLst>
       <p:par>
-        <p:cTn xmlns:p14="http://schemas.microsoft.com/office/powerpoint/2010/main" id="1" dur="indefinite" restart="never" nodeType="tmRoot"/>
+        <p:cTn id="1" dur="indefinite" restart="never" nodeType="tmRoot"/>
       </p:par>
     </p:tnLst>
   </p:timing>
@@ -14225,7 +14292,7 @@
   <p:timing>
     <p:tnLst>
       <p:par>
-        <p:cTn xmlns:p14="http://schemas.microsoft.com/office/powerpoint/2010/main" id="1" dur="indefinite" restart="never" nodeType="tmRoot">
+        <p:cTn id="1" dur="indefinite" restart="never" nodeType="tmRoot">
           <p:childTnLst>
             <p:seq concurrent="1" nextAc="seek">
               <p:cTn id="2" dur="indefinite" nodeType="mainSeq">
@@ -14908,7 +14975,7 @@
   <p:timing>
     <p:tnLst>
       <p:par>
-        <p:cTn xmlns:p14="http://schemas.microsoft.com/office/powerpoint/2010/main" id="1" dur="indefinite" restart="never" nodeType="tmRoot"/>
+        <p:cTn id="1" dur="indefinite" restart="never" nodeType="tmRoot"/>
       </p:par>
     </p:tnLst>
   </p:timing>
@@ -15152,7 +15219,7 @@
   <p:timing>
     <p:tnLst>
       <p:par>
-        <p:cTn xmlns:p14="http://schemas.microsoft.com/office/powerpoint/2010/main" id="1" dur="indefinite" restart="never" nodeType="tmRoot"/>
+        <p:cTn id="1" dur="indefinite" restart="never" nodeType="tmRoot"/>
       </p:par>
     </p:tnLst>
   </p:timing>
@@ -16322,7 +16389,7 @@
   <p:timing>
     <p:tnLst>
       <p:par>
-        <p:cTn xmlns:p14="http://schemas.microsoft.com/office/powerpoint/2010/main" id="1" dur="indefinite" restart="never" nodeType="tmRoot">
+        <p:cTn id="1" dur="indefinite" restart="never" nodeType="tmRoot">
           <p:childTnLst>
             <p:seq concurrent="1" nextAc="seek">
               <p:cTn id="2" dur="indefinite" nodeType="mainSeq">
@@ -17797,7 +17864,7 @@
   <p:timing>
     <p:tnLst>
       <p:par>
-        <p:cTn xmlns:p14="http://schemas.microsoft.com/office/powerpoint/2010/main" id="1" dur="indefinite" restart="never" nodeType="tmRoot">
+        <p:cTn id="1" dur="indefinite" restart="never" nodeType="tmRoot">
           <p:childTnLst>
             <p:seq concurrent="1" nextAc="seek">
               <p:cTn id="2" dur="indefinite" nodeType="mainSeq">
@@ -19011,13 +19078,13 @@
       <p:transition p14:dur="0"/>
     </mc:Choice>
     <mc:Fallback>
-      <p:transition xmlns:p14="http://schemas.microsoft.com/office/powerpoint/2010/main"/>
+      <p:transition/>
     </mc:Fallback>
   </mc:AlternateContent>
   <p:timing>
     <p:tnLst>
       <p:par>
-        <p:cTn xmlns:p14="http://schemas.microsoft.com/office/powerpoint/2010/main" id="1" dur="indefinite" restart="never" nodeType="tmRoot">
+        <p:cTn id="1" dur="indefinite" restart="never" nodeType="tmRoot">
           <p:childTnLst>
             <p:seq concurrent="1" nextAc="seek">
               <p:cTn id="2" dur="indefinite" nodeType="mainSeq">
@@ -19446,7 +19513,7 @@
   <p:timing>
     <p:tnLst>
       <p:par>
-        <p:cTn xmlns:p14="http://schemas.microsoft.com/office/powerpoint/2010/main" id="1" dur="indefinite" restart="never" nodeType="tmRoot"/>
+        <p:cTn id="1" dur="indefinite" restart="never" nodeType="tmRoot"/>
       </p:par>
     </p:tnLst>
   </p:timing>
@@ -19509,13 +19576,8 @@
           <a:p>
             <a:r>
               <a:rPr lang="en-US" dirty="0" smtClean="0"/>
-              <a:t>The name can be any valid JavaScript </a:t>
-            </a:r>
-            <a:r>
-              <a:rPr lang="en-US" dirty="0" smtClean="0"/>
-              <a:t>name.  Creates a local variable with that name.</a:t>
-            </a:r>
-            <a:endParaRPr lang="en-US" dirty="0" smtClean="0"/>
+              <a:t>The name can be any valid JavaScript name.  Creates a local variable with that name.</a:t>
+            </a:r>
           </a:p>
           <a:p>
             <a:r>
@@ -19526,15 +19588,7 @@
           <a:p>
             <a:r>
               <a:rPr lang="en-US" dirty="0" smtClean="0"/>
-              <a:t>Typically used when the parent context and the child context have </a:t>
-            </a:r>
-            <a:r>
-              <a:rPr lang="en-US" dirty="0" smtClean="0"/>
-              <a:t>variables </a:t>
-            </a:r>
-            <a:r>
-              <a:rPr lang="en-US" dirty="0" smtClean="0"/>
-              <a:t>of </a:t>
+              <a:t>Typically used when the parent context and the child context have variables of </a:t>
             </a:r>
             <a:r>
               <a:rPr lang="en-US" dirty="0" smtClean="0">
@@ -19698,7 +19752,7 @@
   <p:timing>
     <p:tnLst>
       <p:par>
-        <p:cTn xmlns:p14="http://schemas.microsoft.com/office/powerpoint/2010/main" id="1" dur="indefinite" restart="never" nodeType="tmRoot"/>
+        <p:cTn id="1" dur="indefinite" restart="never" nodeType="tmRoot"/>
       </p:par>
     </p:tnLst>
   </p:timing>
@@ -20022,7 +20076,7 @@
   <p:timing>
     <p:tnLst>
       <p:par>
-        <p:cTn xmlns:p14="http://schemas.microsoft.com/office/powerpoint/2010/main" id="1" dur="indefinite" restart="never" nodeType="tmRoot"/>
+        <p:cTn id="1" dur="indefinite" restart="never" nodeType="tmRoot"/>
       </p:par>
     </p:tnLst>
   </p:timing>
@@ -20257,7 +20311,7 @@
   <p:timing>
     <p:tnLst>
       <p:par>
-        <p:cTn xmlns:p14="http://schemas.microsoft.com/office/powerpoint/2010/main" id="1" dur="indefinite" restart="never" nodeType="tmRoot"/>
+        <p:cTn id="1" dur="indefinite" restart="never" nodeType="tmRoot"/>
       </p:par>
     </p:tnLst>
   </p:timing>
@@ -20382,7 +20436,7 @@
   <p:timing>
     <p:tnLst>
       <p:par>
-        <p:cTn xmlns:p14="http://schemas.microsoft.com/office/powerpoint/2010/main" id="1" dur="indefinite" restart="never" nodeType="tmRoot"/>
+        <p:cTn id="1" dur="indefinite" restart="never" nodeType="tmRoot"/>
       </p:par>
     </p:tnLst>
   </p:timing>
@@ -20593,7 +20647,7 @@
   <p:timing>
     <p:tnLst>
       <p:par>
-        <p:cTn xmlns:p14="http://schemas.microsoft.com/office/powerpoint/2010/main" id="1" dur="indefinite" restart="never" nodeType="tmRoot"/>
+        <p:cTn id="1" dur="indefinite" restart="never" nodeType="tmRoot"/>
       </p:par>
     </p:tnLst>
   </p:timing>
@@ -21509,7 +21563,7 @@
   <p:timing>
     <p:tnLst>
       <p:par>
-        <p:cTn xmlns:p14="http://schemas.microsoft.com/office/powerpoint/2010/main" id="1" dur="indefinite" restart="never" nodeType="tmRoot">
+        <p:cTn id="1" dur="indefinite" restart="never" nodeType="tmRoot">
           <p:childTnLst>
             <p:seq concurrent="1" nextAc="seek">
               <p:cTn id="2" dur="indefinite" nodeType="mainSeq">
@@ -21920,7 +21974,7 @@
   <p:timing>
     <p:tnLst>
       <p:par>
-        <p:cTn xmlns:p14="http://schemas.microsoft.com/office/powerpoint/2010/main" id="1" dur="indefinite" restart="never" nodeType="tmRoot"/>
+        <p:cTn id="1" dur="indefinite" restart="never" nodeType="tmRoot"/>
       </p:par>
     </p:tnLst>
   </p:timing>
@@ -23156,7 +23210,7 @@
   <p:timing>
     <p:tnLst>
       <p:par>
-        <p:cTn xmlns:p14="http://schemas.microsoft.com/office/powerpoint/2010/main" id="1" dur="indefinite" restart="never" nodeType="tmRoot"/>
+        <p:cTn id="1" dur="indefinite" restart="never" nodeType="tmRoot"/>
       </p:par>
     </p:tnLst>
   </p:timing>
@@ -24447,7 +24501,7 @@
   <p:timing>
     <p:tnLst>
       <p:par>
-        <p:cTn xmlns:p14="http://schemas.microsoft.com/office/powerpoint/2010/main" id="1" dur="indefinite" restart="never" nodeType="tmRoot"/>
+        <p:cTn id="1" dur="indefinite" restart="never" nodeType="tmRoot"/>
       </p:par>
     </p:tnLst>
   </p:timing>
@@ -25018,7 +25072,7 @@
   <p:timing>
     <p:tnLst>
       <p:par>
-        <p:cTn xmlns:p14="http://schemas.microsoft.com/office/powerpoint/2010/main" id="1" dur="indefinite" restart="never" nodeType="tmRoot"/>
+        <p:cTn id="1" dur="indefinite" restart="never" nodeType="tmRoot"/>
       </p:par>
     </p:tnLst>
   </p:timing>
@@ -25377,7 +25431,7 @@
   <p:timing>
     <p:tnLst>
       <p:par>
-        <p:cTn xmlns:p14="http://schemas.microsoft.com/office/powerpoint/2010/main" id="1" dur="indefinite" restart="never" nodeType="tmRoot"/>
+        <p:cTn id="1" dur="indefinite" restart="never" nodeType="tmRoot"/>
       </p:par>
     </p:tnLst>
   </p:timing>
@@ -25617,7 +25671,7 @@
   <p:timing>
     <p:tnLst>
       <p:par>
-        <p:cTn xmlns:p14="http://schemas.microsoft.com/office/powerpoint/2010/main" id="1" dur="indefinite" restart="never" nodeType="tmRoot"/>
+        <p:cTn id="1" dur="indefinite" restart="never" nodeType="tmRoot"/>
       </p:par>
     </p:tnLst>
   </p:timing>
@@ -25876,7 +25930,7 @@
   <p:timing>
     <p:tnLst>
       <p:par>
-        <p:cTn xmlns:p14="http://schemas.microsoft.com/office/powerpoint/2010/main" id="1" dur="indefinite" restart="never" nodeType="tmRoot"/>
+        <p:cTn id="1" dur="indefinite" restart="never" nodeType="tmRoot"/>
       </p:par>
     </p:tnLst>
   </p:timing>
@@ -26077,7 +26131,7 @@
   <p:timing>
     <p:tnLst>
       <p:par>
-        <p:cTn xmlns:p14="http://schemas.microsoft.com/office/powerpoint/2010/main" id="1" dur="indefinite" restart="never" nodeType="tmRoot"/>
+        <p:cTn id="1" dur="indefinite" restart="never" nodeType="tmRoot"/>
       </p:par>
     </p:tnLst>
   </p:timing>
@@ -26121,122 +26175,123 @@
             </a:pPr>
             <a:r>
               <a:rPr lang="en-US" dirty="0" smtClean="0"/>
-              <a:t>The </a:t>
-            </a:r>
-            <a:r>
-              <a:rPr lang="en-US" sz="2000" dirty="0" smtClean="0">
-                <a:latin typeface="Monaco"/>
-              </a:rPr>
-              <a:t>select</a:t>
+              <a:t>By default, Kraken does NOT enable the </a:t>
+            </a:r>
+            <a:r>
+              <a:rPr lang="en-US" dirty="0" smtClean="0">
+                <a:solidFill>
+                  <a:srgbClr val="FF0000"/>
+                </a:solidFill>
+              </a:rPr>
+              <a:t>‘</a:t>
+            </a:r>
+            <a:r>
+              <a:rPr lang="en-US" dirty="0" err="1" smtClean="0">
+                <a:solidFill>
+                  <a:srgbClr val="FF0000"/>
+                </a:solidFill>
+              </a:rPr>
+              <a:t>dustjs</a:t>
+            </a:r>
+            <a:r>
+              <a:rPr lang="en-US" dirty="0" smtClean="0">
+                <a:solidFill>
+                  <a:srgbClr val="FF0000"/>
+                </a:solidFill>
+              </a:rPr>
+              <a:t>-helpers</a:t>
             </a:r>
             <a:r>
               <a:rPr lang="en-US" dirty="0" smtClean="0"/>
-              <a:t> helper mimics a common switch statement</a:t>
-            </a:r>
-          </a:p>
-          <a:p>
+              <a:t>’</a:t>
+            </a:r>
+          </a:p>
+          <a:p>
+            <a:pPr marL="0" indent="0">
+              <a:buNone/>
+            </a:pPr>
             <a:r>
               <a:rPr lang="en-US" dirty="0" smtClean="0"/>
-              <a:t>The body is a series of comparators with an optional </a:t>
-            </a:r>
-            <a:r>
-              <a:rPr lang="en-US" sz="2000" dirty="0">
-                <a:latin typeface="Monaco"/>
-              </a:rPr>
-              <a:t>default</a:t>
+              <a:t>Configure them by adding another helper in ‘</a:t>
+            </a:r>
+            <a:r>
+              <a:rPr lang="en-US" dirty="0" err="1" smtClean="0">
+                <a:solidFill>
+                  <a:srgbClr val="FF0000"/>
+                </a:solidFill>
+              </a:rPr>
+              <a:t>config</a:t>
+            </a:r>
+            <a:r>
+              <a:rPr lang="en-US" dirty="0" smtClean="0">
+                <a:solidFill>
+                  <a:srgbClr val="FF0000"/>
+                </a:solidFill>
+              </a:rPr>
+              <a:t>/</a:t>
+            </a:r>
+            <a:r>
+              <a:rPr lang="en-US" dirty="0" err="1" smtClean="0">
+                <a:solidFill>
+                  <a:srgbClr val="FF0000"/>
+                </a:solidFill>
+              </a:rPr>
+              <a:t>config.json</a:t>
             </a:r>
             <a:r>
               <a:rPr lang="en-US" dirty="0" smtClean="0"/>
-              <a:t> case</a:t>
-            </a:r>
-          </a:p>
-          <a:p>
-            <a:r>
-              <a:rPr lang="en-US" sz="2000" dirty="0">
-                <a:latin typeface="Monaco"/>
-              </a:rPr>
-              <a:t>select</a:t>
-            </a:r>
-            <a:r>
-              <a:rPr lang="en-US" dirty="0"/>
-              <a:t> takes one parameter—</a:t>
-            </a:r>
-            <a:r>
-              <a:rPr lang="en-US" sz="2000" dirty="0">
+              <a:t>’</a:t>
+            </a:r>
+          </a:p>
+          <a:p>
+            <a:pPr marL="0" indent="0">
+              <a:buNone/>
+            </a:pPr>
+            <a:r>
+              <a:rPr lang="en-US" dirty="0" smtClean="0"/>
+              <a:t>Note: the ‘</a:t>
+            </a:r>
+            <a:r>
+              <a:rPr lang="en-US" dirty="0" smtClean="0">
                 <a:solidFill>
                   <a:srgbClr val="FF0000"/>
                 </a:solidFill>
-                <a:latin typeface="Monaco"/>
-              </a:rPr>
-              <a:t>key</a:t>
-            </a:r>
-            <a:r>
-              <a:rPr lang="en-US" dirty="0"/>
-              <a:t>—the value against which the comparators will </a:t>
+              </a:rPr>
+              <a:t>dust-</a:t>
+            </a:r>
+            <a:r>
+              <a:rPr lang="en-US" dirty="0" err="1" smtClean="0">
+                <a:solidFill>
+                  <a:srgbClr val="FF0000"/>
+                </a:solidFill>
+              </a:rPr>
+              <a:t>makara</a:t>
+            </a:r>
+            <a:r>
+              <a:rPr lang="en-US" dirty="0" smtClean="0">
+                <a:solidFill>
+                  <a:srgbClr val="FF0000"/>
+                </a:solidFill>
+              </a:rPr>
+              <a:t>-helpers</a:t>
             </a:r>
             <a:r>
               <a:rPr lang="en-US" dirty="0" smtClean="0"/>
-              <a:t>operate</a:t>
+              <a:t>’ configures the I18N translations.</a:t>
             </a:r>
             <a:endParaRPr lang="en-US" dirty="0"/>
           </a:p>
           <a:p>
-            <a:r>
-              <a:rPr lang="en-US" dirty="0" smtClean="0"/>
-              <a:t>The first comparator to evaluate to </a:t>
-            </a:r>
-            <a:r>
-              <a:rPr lang="en-US" sz="2000" dirty="0">
-                <a:latin typeface="Monaco"/>
-              </a:rPr>
-              <a:t>true</a:t>
-            </a:r>
-            <a:r>
-              <a:rPr lang="en-US" dirty="0" smtClean="0"/>
-              <a:t> is selected</a:t>
-            </a:r>
-          </a:p>
-          <a:p>
-            <a:r>
-              <a:rPr lang="en-US" dirty="0" smtClean="0"/>
-              <a:t>If no comparator evaluates to </a:t>
-            </a:r>
-            <a:r>
-              <a:rPr lang="en-US" sz="2000" dirty="0">
-                <a:latin typeface="Monaco"/>
-              </a:rPr>
-              <a:t>true</a:t>
-            </a:r>
-            <a:r>
-              <a:rPr lang="en-US" dirty="0" smtClean="0"/>
-              <a:t>, the </a:t>
-            </a:r>
-            <a:r>
-              <a:rPr lang="en-US" sz="2000" dirty="0">
-                <a:latin typeface="Monaco"/>
-              </a:rPr>
-              <a:t>default</a:t>
-            </a:r>
-            <a:r>
-              <a:rPr lang="en-US" dirty="0" smtClean="0"/>
-              <a:t> is selected</a:t>
-            </a:r>
-          </a:p>
-          <a:p>
-            <a:r>
-              <a:rPr lang="en-US" dirty="0" smtClean="0"/>
-              <a:t>And, if there is no </a:t>
-            </a:r>
-            <a:r>
-              <a:rPr lang="en-US" sz="2000" dirty="0">
-                <a:latin typeface="Monaco"/>
-              </a:rPr>
-              <a:t>default</a:t>
-            </a:r>
-            <a:r>
-              <a:rPr lang="en-US" dirty="0" smtClean="0"/>
-              <a:t>, nothing is written</a:t>
-            </a:r>
+            <a:pPr marL="0" indent="0">
+              <a:buNone/>
+            </a:pPr>
+            <a:endParaRPr lang="en-US" dirty="0" smtClean="0"/>
+          </a:p>
+          <a:p>
+            <a:pPr marL="0" indent="0">
+              <a:buNone/>
+            </a:pPr>
+            <a:endParaRPr lang="en-US" dirty="0"/>
           </a:p>
         </p:txBody>
       </p:sp>
@@ -26257,7 +26312,7 @@
           <a:p>
             <a:r>
               <a:rPr lang="en-US" dirty="0" smtClean="0"/>
-              <a:t>Logic Helpers: select</a:t>
+              <a:t>Helpers configuration with Kraken</a:t>
             </a:r>
             <a:endParaRPr lang="en-US" dirty="0"/>
           </a:p>
@@ -26295,6 +26350,269 @@
           </a:p>
         </p:txBody>
       </p:sp>
+      <p:pic>
+        <p:nvPicPr>
+          <p:cNvPr id="5" name="Picture 4"/>
+          <p:cNvPicPr>
+            <a:picLocks noChangeAspect="1"/>
+          </p:cNvPicPr>
+          <p:nvPr/>
+        </p:nvPicPr>
+        <p:blipFill>
+          <a:blip r:embed="rId2"/>
+          <a:stretch>
+            <a:fillRect/>
+          </a:stretch>
+        </p:blipFill>
+        <p:spPr>
+          <a:xfrm>
+            <a:off x="1310070" y="3962400"/>
+            <a:ext cx="5011769" cy="2209800"/>
+          </a:xfrm>
+          <a:prstGeom prst="rect">
+            <a:avLst/>
+          </a:prstGeom>
+        </p:spPr>
+      </p:pic>
+    </p:spTree>
+    <p:extLst>
+      <p:ext uri="{BB962C8B-B14F-4D97-AF65-F5344CB8AC3E}">
+        <p14:creationId xmlns:p14="http://schemas.microsoft.com/office/powerpoint/2010/main" val="1344268478"/>
+      </p:ext>
+    </p:extLst>
+  </p:cSld>
+  <p:clrMapOvr>
+    <a:masterClrMapping/>
+  </p:clrMapOvr>
+  <mc:AlternateContent xmlns:mc="http://schemas.openxmlformats.org/markup-compatibility/2006" xmlns:p14="http://schemas.microsoft.com/office/powerpoint/2010/main">
+    <mc:Choice Requires="p14">
+      <p:transition p14:dur="0"/>
+    </mc:Choice>
+    <mc:Fallback xmlns="">
+      <p:transition/>
+    </mc:Fallback>
+  </mc:AlternateContent>
+  <p:timing>
+    <p:tnLst>
+      <p:par>
+        <p:cTn id="1" dur="indefinite" restart="never" nodeType="tmRoot"/>
+      </p:par>
+    </p:tnLst>
+  </p:timing>
+</p:sld>
+</file>
+
+<file path=ppt/slides/slide35.xml><?xml version="1.0" encoding="utf-8"?>
+<p:sld xmlns:a="http://schemas.openxmlformats.org/drawingml/2006/main" xmlns:r="http://schemas.openxmlformats.org/officeDocument/2006/relationships" xmlns:p="http://schemas.openxmlformats.org/presentationml/2006/main">
+  <p:cSld>
+    <p:spTree>
+      <p:nvGrpSpPr>
+        <p:cNvPr id="1" name=""/>
+        <p:cNvGrpSpPr/>
+        <p:nvPr/>
+      </p:nvGrpSpPr>
+      <p:grpSpPr>
+        <a:xfrm>
+          <a:off x="0" y="0"/>
+          <a:ext cx="0" cy="0"/>
+          <a:chOff x="0" y="0"/>
+          <a:chExt cx="0" cy="0"/>
+        </a:xfrm>
+      </p:grpSpPr>
+      <p:sp>
+        <p:nvSpPr>
+          <p:cNvPr id="3" name="Content Placeholder 2"/>
+          <p:cNvSpPr>
+            <a:spLocks noGrp="1"/>
+          </p:cNvSpPr>
+          <p:nvPr>
+            <p:ph type="body" sz="quarter" idx="12"/>
+          </p:nvPr>
+        </p:nvSpPr>
+        <p:spPr/>
+        <p:txBody>
+          <a:bodyPr/>
+          <a:lstStyle/>
+          <a:p>
+            <a:pPr marL="0" indent="0">
+              <a:buNone/>
+            </a:pPr>
+            <a:r>
+              <a:rPr lang="en-US" dirty="0" smtClean="0"/>
+              <a:t>The </a:t>
+            </a:r>
+            <a:r>
+              <a:rPr lang="en-US" sz="2000" dirty="0" smtClean="0">
+                <a:latin typeface="Monaco"/>
+              </a:rPr>
+              <a:t>select</a:t>
+            </a:r>
+            <a:r>
+              <a:rPr lang="en-US" dirty="0" smtClean="0"/>
+              <a:t> helper mimics a common switch statement</a:t>
+            </a:r>
+          </a:p>
+          <a:p>
+            <a:r>
+              <a:rPr lang="en-US" dirty="0" smtClean="0"/>
+              <a:t>The body is a series of comparators with an optional </a:t>
+            </a:r>
+            <a:r>
+              <a:rPr lang="en-US" sz="2000" dirty="0">
+                <a:latin typeface="Monaco"/>
+              </a:rPr>
+              <a:t>default</a:t>
+            </a:r>
+            <a:r>
+              <a:rPr lang="en-US" dirty="0" smtClean="0"/>
+              <a:t> case</a:t>
+            </a:r>
+          </a:p>
+          <a:p>
+            <a:r>
+              <a:rPr lang="en-US" sz="2000" dirty="0">
+                <a:latin typeface="Monaco"/>
+              </a:rPr>
+              <a:t>select</a:t>
+            </a:r>
+            <a:r>
+              <a:rPr lang="en-US" dirty="0"/>
+              <a:t> takes one parameter—</a:t>
+            </a:r>
+            <a:r>
+              <a:rPr lang="en-US" sz="2000" dirty="0">
+                <a:solidFill>
+                  <a:srgbClr val="FF0000"/>
+                </a:solidFill>
+                <a:latin typeface="Monaco"/>
+              </a:rPr>
+              <a:t>key</a:t>
+            </a:r>
+            <a:r>
+              <a:rPr lang="en-US" dirty="0"/>
+              <a:t>—the value against which the comparators will </a:t>
+            </a:r>
+            <a:r>
+              <a:rPr lang="en-US" dirty="0" smtClean="0"/>
+              <a:t>operate</a:t>
+            </a:r>
+            <a:endParaRPr lang="en-US" dirty="0"/>
+          </a:p>
+          <a:p>
+            <a:r>
+              <a:rPr lang="en-US" dirty="0" smtClean="0"/>
+              <a:t>The first comparator to evaluate to </a:t>
+            </a:r>
+            <a:r>
+              <a:rPr lang="en-US" sz="2000" dirty="0">
+                <a:latin typeface="Monaco"/>
+              </a:rPr>
+              <a:t>true</a:t>
+            </a:r>
+            <a:r>
+              <a:rPr lang="en-US" dirty="0" smtClean="0"/>
+              <a:t> is selected</a:t>
+            </a:r>
+          </a:p>
+          <a:p>
+            <a:r>
+              <a:rPr lang="en-US" dirty="0" smtClean="0"/>
+              <a:t>If no comparator evaluates to </a:t>
+            </a:r>
+            <a:r>
+              <a:rPr lang="en-US" sz="2000" dirty="0">
+                <a:latin typeface="Monaco"/>
+              </a:rPr>
+              <a:t>true</a:t>
+            </a:r>
+            <a:r>
+              <a:rPr lang="en-US" dirty="0" smtClean="0"/>
+              <a:t>, the </a:t>
+            </a:r>
+            <a:r>
+              <a:rPr lang="en-US" sz="2000" dirty="0">
+                <a:latin typeface="Monaco"/>
+              </a:rPr>
+              <a:t>default</a:t>
+            </a:r>
+            <a:r>
+              <a:rPr lang="en-US" dirty="0" smtClean="0"/>
+              <a:t> is selected</a:t>
+            </a:r>
+          </a:p>
+          <a:p>
+            <a:r>
+              <a:rPr lang="en-US" dirty="0" smtClean="0"/>
+              <a:t>And, if there is no </a:t>
+            </a:r>
+            <a:r>
+              <a:rPr lang="en-US" sz="2000" dirty="0">
+                <a:latin typeface="Monaco"/>
+              </a:rPr>
+              <a:t>default</a:t>
+            </a:r>
+            <a:r>
+              <a:rPr lang="en-US" dirty="0" smtClean="0"/>
+              <a:t>, nothing is written</a:t>
+            </a:r>
+          </a:p>
+        </p:txBody>
+      </p:sp>
+      <p:sp>
+        <p:nvSpPr>
+          <p:cNvPr id="2" name="Title 1"/>
+          <p:cNvSpPr>
+            <a:spLocks noGrp="1"/>
+          </p:cNvSpPr>
+          <p:nvPr>
+            <p:ph type="title"/>
+          </p:nvPr>
+        </p:nvSpPr>
+        <p:spPr/>
+        <p:txBody>
+          <a:bodyPr/>
+          <a:lstStyle/>
+          <a:p>
+            <a:r>
+              <a:rPr lang="en-US" dirty="0" smtClean="0"/>
+              <a:t>Logic Helpers: select</a:t>
+            </a:r>
+            <a:endParaRPr lang="en-US" dirty="0"/>
+          </a:p>
+        </p:txBody>
+      </p:sp>
+      <p:sp>
+        <p:nvSpPr>
+          <p:cNvPr id="4" name="Slide Number Placeholder 3"/>
+          <p:cNvSpPr>
+            <a:spLocks noGrp="1"/>
+          </p:cNvSpPr>
+          <p:nvPr>
+            <p:ph type="sldNum" sz="quarter" idx="4294967295"/>
+          </p:nvPr>
+        </p:nvSpPr>
+        <p:spPr>
+          <a:xfrm>
+            <a:off x="8237538" y="6553200"/>
+            <a:ext cx="906462" cy="457200"/>
+          </a:xfrm>
+          <a:prstGeom prst="rect">
+            <a:avLst/>
+          </a:prstGeom>
+        </p:spPr>
+        <p:txBody>
+          <a:bodyPr/>
+          <a:lstStyle/>
+          <a:p>
+            <a:fld id="{0D854ACF-EFF3-42D3-AB5F-408268493A1F}" type="slidenum">
+              <a:rPr lang="en-US" smtClean="0"/>
+              <a:pPr/>
+              <a:t>35</a:t>
+            </a:fld>
+            <a:endParaRPr lang="en-US" dirty="0"/>
+          </a:p>
+        </p:txBody>
+      </p:sp>
     </p:spTree>
     <p:extLst>
       <p:ext uri="{BB962C8B-B14F-4D97-AF65-F5344CB8AC3E}">
@@ -26316,14 +26634,14 @@
   <p:timing>
     <p:tnLst>
       <p:par>
-        <p:cTn xmlns:p14="http://schemas.microsoft.com/office/powerpoint/2010/main" id="1" dur="indefinite" restart="never" nodeType="tmRoot"/>
+        <p:cTn id="1" dur="indefinite" restart="never" nodeType="tmRoot"/>
       </p:par>
     </p:tnLst>
   </p:timing>
 </p:sld>
 </file>
 
-<file path=ppt/slides/slide35.xml><?xml version="1.0" encoding="utf-8"?>
+<file path=ppt/slides/slide36.xml><?xml version="1.0" encoding="utf-8"?>
 <p:sld xmlns:a="http://schemas.openxmlformats.org/drawingml/2006/main" xmlns:r="http://schemas.openxmlformats.org/officeDocument/2006/relationships" xmlns:p="http://schemas.openxmlformats.org/presentationml/2006/main">
   <p:cSld>
     <p:spTree>
@@ -26389,7 +26707,7 @@
             <a:fld id="{0D854ACF-EFF3-42D3-AB5F-408268493A1F}" type="slidenum">
               <a:rPr lang="en-US" smtClean="0"/>
               <a:pPr/>
-              <a:t>35</a:t>
+              <a:t>36</a:t>
             </a:fld>
             <a:endParaRPr lang="en-US" dirty="0"/>
           </a:p>
@@ -27133,7 +27451,7 @@
   <p:timing>
     <p:tnLst>
       <p:par>
-        <p:cTn xmlns:p14="http://schemas.microsoft.com/office/powerpoint/2010/main" id="1" dur="indefinite" restart="never" nodeType="tmRoot">
+        <p:cTn id="1" dur="indefinite" restart="never" nodeType="tmRoot">
           <p:childTnLst>
             <p:seq concurrent="1" nextAc="seek">
               <p:cTn id="2" dur="indefinite" nodeType="mainSeq">
@@ -27239,7 +27557,7 @@
 </p:sld>
 </file>
 
-<file path=ppt/slides/slide36.xml><?xml version="1.0" encoding="utf-8"?>
+<file path=ppt/slides/slide37.xml><?xml version="1.0" encoding="utf-8"?>
 <p:sld xmlns:a="http://schemas.openxmlformats.org/drawingml/2006/main" xmlns:r="http://schemas.openxmlformats.org/officeDocument/2006/relationships" xmlns:p="http://schemas.openxmlformats.org/presentationml/2006/main">
   <p:cSld>
     <p:spTree>
@@ -27392,7 +27710,7 @@
             <a:fld id="{0D854ACF-EFF3-42D3-AB5F-408268493A1F}" type="slidenum">
               <a:rPr lang="en-US" smtClean="0"/>
               <a:pPr/>
-              <a:t>36</a:t>
+              <a:t>37</a:t>
             </a:fld>
             <a:endParaRPr lang="en-US" dirty="0"/>
           </a:p>
@@ -27419,14 +27737,14 @@
   <p:timing>
     <p:tnLst>
       <p:par>
-        <p:cTn xmlns:p14="http://schemas.microsoft.com/office/powerpoint/2010/main" id="1" dur="indefinite" restart="never" nodeType="tmRoot"/>
+        <p:cTn id="1" dur="indefinite" restart="never" nodeType="tmRoot"/>
       </p:par>
     </p:tnLst>
   </p:timing>
 </p:sld>
 </file>
 
-<file path=ppt/slides/slide37.xml><?xml version="1.0" encoding="utf-8"?>
+<file path=ppt/slides/slide38.xml><?xml version="1.0" encoding="utf-8"?>
 <p:sld xmlns:a="http://schemas.openxmlformats.org/drawingml/2006/main" xmlns:r="http://schemas.openxmlformats.org/officeDocument/2006/relationships" xmlns:p="http://schemas.openxmlformats.org/presentationml/2006/main">
   <p:cSld>
     <p:spTree>
@@ -27517,7 +27835,7 @@
             <a:fld id="{0D854ACF-EFF3-42D3-AB5F-408268493A1F}" type="slidenum">
               <a:rPr lang="en-US" smtClean="0"/>
               <a:pPr/>
-              <a:t>37</a:t>
+              <a:t>38</a:t>
             </a:fld>
             <a:endParaRPr lang="en-US" dirty="0"/>
           </a:p>
@@ -27544,14 +27862,312 @@
   <p:timing>
     <p:tnLst>
       <p:par>
-        <p:cTn xmlns:p14="http://schemas.microsoft.com/office/powerpoint/2010/main" id="1" dur="indefinite" restart="never" nodeType="tmRoot"/>
+        <p:cTn id="1" dur="indefinite" restart="never" nodeType="tmRoot"/>
       </p:par>
     </p:tnLst>
   </p:timing>
 </p:sld>
 </file>
 
-<file path=ppt/slides/slide38.xml><?xml version="1.0" encoding="utf-8"?>
+<file path=ppt/slides/slide39.xml><?xml version="1.0" encoding="utf-8"?>
+<p:sld xmlns:a="http://schemas.openxmlformats.org/drawingml/2006/main" xmlns:r="http://schemas.openxmlformats.org/officeDocument/2006/relationships" xmlns:p="http://schemas.openxmlformats.org/presentationml/2006/main">
+  <p:cSld>
+    <p:spTree>
+      <p:nvGrpSpPr>
+        <p:cNvPr id="1" name=""/>
+        <p:cNvGrpSpPr/>
+        <p:nvPr/>
+      </p:nvGrpSpPr>
+      <p:grpSpPr>
+        <a:xfrm>
+          <a:off x="0" y="0"/>
+          <a:ext cx="0" cy="0"/>
+          <a:chOff x="0" y="0"/>
+          <a:chExt cx="0" cy="0"/>
+        </a:xfrm>
+      </p:grpSpPr>
+      <p:sp>
+        <p:nvSpPr>
+          <p:cNvPr id="2" name="Text Placeholder 1"/>
+          <p:cNvSpPr>
+            <a:spLocks noGrp="1"/>
+          </p:cNvSpPr>
+          <p:nvPr>
+            <p:ph type="body" sz="quarter" idx="12"/>
+          </p:nvPr>
+        </p:nvSpPr>
+        <p:spPr/>
+        <p:txBody>
+          <a:bodyPr/>
+          <a:lstStyle/>
+          <a:p>
+            <a:r>
+              <a:rPr lang="en-US" dirty="0" smtClean="0"/>
+              <a:t>The ‘key’ and ‘value’ attributes can have many types:</a:t>
+            </a:r>
+          </a:p>
+          <a:p>
+            <a:r>
+              <a:rPr lang="en-US" dirty="0" smtClean="0"/>
+              <a:t>With no quotation marks, it searches for model data.</a:t>
+            </a:r>
+          </a:p>
+          <a:p>
+            <a:r>
+              <a:rPr lang="en-US" dirty="0" smtClean="0"/>
+              <a:t>With quotation marks, it is a string literal</a:t>
+            </a:r>
+          </a:p>
+          <a:p>
+            <a:r>
+              <a:rPr lang="en-US" dirty="0" smtClean="0"/>
+              <a:t>In this example, the key value comes from the model property of </a:t>
+            </a:r>
+            <a:r>
+              <a:rPr lang="en-US" dirty="0" err="1" smtClean="0"/>
+              <a:t>user.name</a:t>
+            </a:r>
+            <a:r>
+              <a:rPr lang="en-US" dirty="0" smtClean="0"/>
+              <a:t>.</a:t>
+            </a:r>
+          </a:p>
+          <a:p>
+            <a:r>
+              <a:rPr lang="en-US" dirty="0" smtClean="0"/>
+              <a:t>This comparator will compare it to the string, “Clay”</a:t>
+            </a:r>
+            <a:endParaRPr lang="en-US" dirty="0"/>
+          </a:p>
+          <a:p>
+            <a:endParaRPr lang="en-US" dirty="0" smtClean="0"/>
+          </a:p>
+          <a:p>
+            <a:endParaRPr lang="en-US" dirty="0"/>
+          </a:p>
+          <a:p>
+            <a:endParaRPr lang="en-US" dirty="0"/>
+          </a:p>
+        </p:txBody>
+      </p:sp>
+      <p:sp>
+        <p:nvSpPr>
+          <p:cNvPr id="3" name="Title 2"/>
+          <p:cNvSpPr>
+            <a:spLocks noGrp="1"/>
+          </p:cNvSpPr>
+          <p:nvPr>
+            <p:ph type="title"/>
+          </p:nvPr>
+        </p:nvSpPr>
+        <p:spPr/>
+        <p:txBody>
+          <a:bodyPr/>
+          <a:lstStyle/>
+          <a:p>
+            <a:r>
+              <a:rPr lang="en-US" dirty="0"/>
+              <a:t>Comparators, Example.</a:t>
+            </a:r>
+          </a:p>
+        </p:txBody>
+      </p:sp>
+      <p:pic>
+        <p:nvPicPr>
+          <p:cNvPr id="4" name="Picture 3"/>
+          <p:cNvPicPr>
+            <a:picLocks noChangeAspect="1"/>
+          </p:cNvPicPr>
+          <p:nvPr/>
+        </p:nvPicPr>
+        <p:blipFill>
+          <a:blip r:embed="rId2"/>
+          <a:stretch>
+            <a:fillRect/>
+          </a:stretch>
+        </p:blipFill>
+        <p:spPr>
+          <a:xfrm>
+            <a:off x="2209800" y="4648200"/>
+            <a:ext cx="4542118" cy="1524000"/>
+          </a:xfrm>
+          <a:prstGeom prst="rect">
+            <a:avLst/>
+          </a:prstGeom>
+        </p:spPr>
+      </p:pic>
+    </p:spTree>
+    <p:extLst>
+      <p:ext uri="{BB962C8B-B14F-4D97-AF65-F5344CB8AC3E}">
+        <p14:creationId xmlns:p14="http://schemas.microsoft.com/office/powerpoint/2010/main" val="828870016"/>
+      </p:ext>
+    </p:extLst>
+  </p:cSld>
+  <p:clrMapOvr>
+    <a:masterClrMapping/>
+  </p:clrMapOvr>
+  <mc:AlternateContent xmlns:mc="http://schemas.openxmlformats.org/markup-compatibility/2006" xmlns:p14="http://schemas.microsoft.com/office/powerpoint/2010/main">
+    <mc:Choice Requires="p14">
+      <p:transition p14:dur="0"/>
+    </mc:Choice>
+    <mc:Fallback xmlns="">
+      <p:transition/>
+    </mc:Fallback>
+  </mc:AlternateContent>
+</p:sld>
+</file>
+
+<file path=ppt/slides/slide4.xml><?xml version="1.0" encoding="utf-8"?>
+<p:sld xmlns:a="http://schemas.openxmlformats.org/drawingml/2006/main" xmlns:r="http://schemas.openxmlformats.org/officeDocument/2006/relationships" xmlns:p="http://schemas.openxmlformats.org/presentationml/2006/main">
+  <p:cSld>
+    <p:spTree>
+      <p:nvGrpSpPr>
+        <p:cNvPr id="1" name=""/>
+        <p:cNvGrpSpPr/>
+        <p:nvPr/>
+      </p:nvGrpSpPr>
+      <p:grpSpPr>
+        <a:xfrm>
+          <a:off x="0" y="0"/>
+          <a:ext cx="0" cy="0"/>
+          <a:chOff x="0" y="0"/>
+          <a:chExt cx="0" cy="0"/>
+        </a:xfrm>
+      </p:grpSpPr>
+      <p:sp>
+        <p:nvSpPr>
+          <p:cNvPr id="3" name="Title 2"/>
+          <p:cNvSpPr>
+            <a:spLocks noGrp="1"/>
+          </p:cNvSpPr>
+          <p:nvPr>
+            <p:ph type="title"/>
+          </p:nvPr>
+        </p:nvSpPr>
+        <p:spPr/>
+        <p:txBody>
+          <a:bodyPr/>
+          <a:lstStyle/>
+          <a:p>
+            <a:r>
+              <a:rPr lang="en-US" dirty="0" smtClean="0"/>
+              <a:t>Decomposing a Web Page</a:t>
+            </a:r>
+            <a:endParaRPr lang="en-US" dirty="0"/>
+          </a:p>
+        </p:txBody>
+      </p:sp>
+      <p:pic>
+        <p:nvPicPr>
+          <p:cNvPr id="4" name="Picture 3"/>
+          <p:cNvPicPr>
+            <a:picLocks noChangeAspect="1"/>
+          </p:cNvPicPr>
+          <p:nvPr/>
+        </p:nvPicPr>
+        <p:blipFill>
+          <a:blip r:embed="rId2"/>
+          <a:stretch>
+            <a:fillRect/>
+          </a:stretch>
+        </p:blipFill>
+        <p:spPr>
+          <a:xfrm>
+            <a:off x="1676400" y="1371600"/>
+            <a:ext cx="6273800" cy="4257221"/>
+          </a:xfrm>
+          <a:prstGeom prst="rect">
+            <a:avLst/>
+          </a:prstGeom>
+        </p:spPr>
+      </p:pic>
+      <p:sp>
+        <p:nvSpPr>
+          <p:cNvPr id="5" name="TextBox 4"/>
+          <p:cNvSpPr txBox="1"/>
+          <p:nvPr/>
+        </p:nvSpPr>
+        <p:spPr>
+          <a:xfrm>
+            <a:off x="663956" y="6019800"/>
+            <a:ext cx="4709417" cy="276999"/>
+          </a:xfrm>
+          <a:prstGeom prst="rect">
+            <a:avLst/>
+          </a:prstGeom>
+          <a:noFill/>
+        </p:spPr>
+        <p:txBody>
+          <a:bodyPr wrap="none" rtlCol="0" anchor="t">
+            <a:spAutoFit/>
+          </a:bodyPr>
+          <a:lstStyle/>
+          <a:p>
+            <a:pPr>
+              <a:spcBef>
+                <a:spcPct val="0"/>
+              </a:spcBef>
+            </a:pPr>
+            <a:r>
+              <a:rPr lang="en-US" sz="1200" dirty="0">
+                <a:cs typeface="Arial"/>
+              </a:rPr>
+              <a:t>http://</a:t>
+            </a:r>
+            <a:r>
+              <a:rPr lang="en-US" sz="1200" dirty="0" err="1">
+                <a:cs typeface="Arial"/>
+              </a:rPr>
+              <a:t>webstyleguide.com</a:t>
+            </a:r>
+            <a:r>
+              <a:rPr lang="en-US" sz="1200" dirty="0">
+                <a:cs typeface="Arial"/>
+              </a:rPr>
+              <a:t>/wsg3/6-page-structure/3-site-design.html</a:t>
+            </a:r>
+            <a:endParaRPr kumimoji="0" lang="en-US" sz="1200" b="0" i="0" u="none" strike="noStrike" kern="1200" spc="0" normalizeH="0" baseline="0" noProof="0" dirty="0" smtClean="0">
+              <a:ln>
+                <a:noFill/>
+              </a:ln>
+              <a:effectLst/>
+              <a:uLnTx/>
+              <a:uFillTx/>
+              <a:latin typeface="Arial"/>
+              <a:cs typeface="Arial"/>
+            </a:endParaRPr>
+          </a:p>
+        </p:txBody>
+      </p:sp>
+    </p:spTree>
+    <p:extLst>
+      <p:ext uri="{BB962C8B-B14F-4D97-AF65-F5344CB8AC3E}">
+        <p14:creationId xmlns:p14="http://schemas.microsoft.com/office/powerpoint/2010/main" val="2573421310"/>
+      </p:ext>
+    </p:extLst>
+  </p:cSld>
+  <p:clrMapOvr>
+    <a:masterClrMapping/>
+  </p:clrMapOvr>
+  <mc:AlternateContent xmlns:mc="http://schemas.openxmlformats.org/markup-compatibility/2006" xmlns:p14="http://schemas.microsoft.com/office/powerpoint/2010/main">
+    <mc:Choice Requires="p14">
+      <p:transition p14:dur="0"/>
+    </mc:Choice>
+    <mc:Fallback xmlns="">
+      <p:transition/>
+    </mc:Fallback>
+  </mc:AlternateContent>
+  <p:timing>
+    <p:tnLst>
+      <p:par>
+        <p:cTn id="1" dur="indefinite" restart="never" nodeType="tmRoot"/>
+      </p:par>
+    </p:tnLst>
+  </p:timing>
+</p:sld>
+</file>
+
+<file path=ppt/slides/slide40.xml><?xml version="1.0" encoding="utf-8"?>
 <p:sld xmlns:a="http://schemas.openxmlformats.org/drawingml/2006/main" xmlns:r="http://schemas.openxmlformats.org/officeDocument/2006/relationships" xmlns:p="http://schemas.openxmlformats.org/presentationml/2006/main">
   <p:cSld>
     <p:spTree>
@@ -27866,7 +28482,7 @@
             <a:fld id="{0D854ACF-EFF3-42D3-AB5F-408268493A1F}" type="slidenum">
               <a:rPr lang="en-US" smtClean="0"/>
               <a:pPr/>
-              <a:t>38</a:t>
+              <a:t>40</a:t>
             </a:fld>
             <a:endParaRPr lang="en-US" dirty="0"/>
           </a:p>
@@ -27893,14 +28509,14 @@
   <p:timing>
     <p:tnLst>
       <p:par>
-        <p:cTn xmlns:p14="http://schemas.microsoft.com/office/powerpoint/2010/main" id="1" dur="indefinite" restart="never" nodeType="tmRoot"/>
+        <p:cTn id="1" dur="indefinite" restart="never" nodeType="tmRoot"/>
       </p:par>
     </p:tnLst>
   </p:timing>
 </p:sld>
 </file>
 
-<file path=ppt/slides/slide39.xml><?xml version="1.0" encoding="utf-8"?>
+<file path=ppt/slides/slide41.xml><?xml version="1.0" encoding="utf-8"?>
 <p:sld xmlns:a="http://schemas.openxmlformats.org/drawingml/2006/main" xmlns:r="http://schemas.openxmlformats.org/officeDocument/2006/relationships" xmlns:p="http://schemas.openxmlformats.org/presentationml/2006/main">
   <p:cSld>
     <p:spTree>
@@ -27966,7 +28582,7 @@
             <a:fld id="{0D854ACF-EFF3-42D3-AB5F-408268493A1F}" type="slidenum">
               <a:rPr lang="en-US" smtClean="0"/>
               <a:pPr/>
-              <a:t>39</a:t>
+              <a:t>41</a:t>
             </a:fld>
             <a:endParaRPr lang="en-US" dirty="0"/>
           </a:p>
@@ -29114,7 +29730,7 @@
   <p:timing>
     <p:tnLst>
       <p:par>
-        <p:cTn xmlns:p14="http://schemas.microsoft.com/office/powerpoint/2010/main" id="1" dur="indefinite" restart="never" nodeType="tmRoot">
+        <p:cTn id="1" dur="indefinite" restart="never" nodeType="tmRoot">
           <p:childTnLst>
             <p:seq concurrent="1" nextAc="seek">
               <p:cTn id="2" dur="indefinite" nodeType="mainSeq">
@@ -29248,157 +29864,7 @@
 </p:sld>
 </file>
 
-<file path=ppt/slides/slide4.xml><?xml version="1.0" encoding="utf-8"?>
-<p:sld xmlns:a="http://schemas.openxmlformats.org/drawingml/2006/main" xmlns:r="http://schemas.openxmlformats.org/officeDocument/2006/relationships" xmlns:p="http://schemas.openxmlformats.org/presentationml/2006/main">
-  <p:cSld>
-    <p:spTree>
-      <p:nvGrpSpPr>
-        <p:cNvPr id="1" name=""/>
-        <p:cNvGrpSpPr/>
-        <p:nvPr/>
-      </p:nvGrpSpPr>
-      <p:grpSpPr>
-        <a:xfrm>
-          <a:off x="0" y="0"/>
-          <a:ext cx="0" cy="0"/>
-          <a:chOff x="0" y="0"/>
-          <a:chExt cx="0" cy="0"/>
-        </a:xfrm>
-      </p:grpSpPr>
-      <p:sp>
-        <p:nvSpPr>
-          <p:cNvPr id="3" name="Title 2"/>
-          <p:cNvSpPr>
-            <a:spLocks noGrp="1"/>
-          </p:cNvSpPr>
-          <p:nvPr>
-            <p:ph type="title"/>
-          </p:nvPr>
-        </p:nvSpPr>
-        <p:spPr/>
-        <p:txBody>
-          <a:bodyPr/>
-          <a:lstStyle/>
-          <a:p>
-            <a:r>
-              <a:rPr lang="en-US" dirty="0" smtClean="0"/>
-              <a:t>Decomposing a Web Page</a:t>
-            </a:r>
-            <a:endParaRPr lang="en-US" dirty="0"/>
-          </a:p>
-        </p:txBody>
-      </p:sp>
-      <p:pic>
-        <p:nvPicPr>
-          <p:cNvPr id="4" name="Picture 3"/>
-          <p:cNvPicPr>
-            <a:picLocks noChangeAspect="1"/>
-          </p:cNvPicPr>
-          <p:nvPr/>
-        </p:nvPicPr>
-        <p:blipFill>
-          <a:blip r:embed="rId2"/>
-          <a:stretch>
-            <a:fillRect/>
-          </a:stretch>
-        </p:blipFill>
-        <p:spPr>
-          <a:xfrm>
-            <a:off x="1676400" y="1371600"/>
-            <a:ext cx="6273800" cy="4257221"/>
-          </a:xfrm>
-          <a:prstGeom prst="rect">
-            <a:avLst/>
-          </a:prstGeom>
-        </p:spPr>
-      </p:pic>
-      <p:sp>
-        <p:nvSpPr>
-          <p:cNvPr id="5" name="TextBox 4"/>
-          <p:cNvSpPr txBox="1"/>
-          <p:nvPr/>
-        </p:nvSpPr>
-        <p:spPr>
-          <a:xfrm>
-            <a:off x="663956" y="6019800"/>
-            <a:ext cx="4709417" cy="276999"/>
-          </a:xfrm>
-          <a:prstGeom prst="rect">
-            <a:avLst/>
-          </a:prstGeom>
-          <a:noFill/>
-        </p:spPr>
-        <p:txBody>
-          <a:bodyPr wrap="none" rtlCol="0" anchor="t">
-            <a:spAutoFit/>
-          </a:bodyPr>
-          <a:lstStyle/>
-          <a:p>
-            <a:pPr>
-              <a:spcBef>
-                <a:spcPct val="0"/>
-              </a:spcBef>
-            </a:pPr>
-            <a:r>
-              <a:rPr lang="en-US" sz="1200" dirty="0">
-                <a:cs typeface="Arial"/>
-              </a:rPr>
-              <a:t>http://</a:t>
-            </a:r>
-            <a:r>
-              <a:rPr lang="en-US" sz="1200" dirty="0" err="1">
-                <a:cs typeface="Arial"/>
-              </a:rPr>
-              <a:t>webstyleguide.com</a:t>
-            </a:r>
-            <a:r>
-              <a:rPr lang="en-US" sz="1200" dirty="0">
-                <a:cs typeface="Arial"/>
-              </a:rPr>
-              <a:t>/wsg3/6-page-structure/3-site-design.html</a:t>
-            </a:r>
-            <a:endParaRPr kumimoji="0" lang="en-US" sz="1200" b="0" i="0" u="none" strike="noStrike" kern="1200" spc="0" normalizeH="0" baseline="0" noProof="0" dirty="0" smtClean="0">
-              <a:ln>
-                <a:noFill/>
-              </a:ln>
-              <a:effectLst/>
-              <a:uLnTx/>
-              <a:uFillTx/>
-              <a:latin typeface="Arial"/>
-              <a:cs typeface="Arial"/>
-            </a:endParaRPr>
-          </a:p>
-        </p:txBody>
-      </p:sp>
-    </p:spTree>
-    <p:extLst>
-      <p:ext uri="{BB962C8B-B14F-4D97-AF65-F5344CB8AC3E}">
-        <p14:creationId xmlns:p14="http://schemas.microsoft.com/office/powerpoint/2010/main" val="2573421310"/>
-      </p:ext>
-    </p:extLst>
-  </p:cSld>
-  <p:clrMapOvr>
-    <a:masterClrMapping/>
-  </p:clrMapOvr>
-  <mc:AlternateContent xmlns:mc="http://schemas.openxmlformats.org/markup-compatibility/2006" xmlns:p14="http://schemas.microsoft.com/office/powerpoint/2010/main">
-    <mc:Choice Requires="p14">
-      <p:transition p14:dur="0"/>
-    </mc:Choice>
-    <mc:Fallback xmlns="">
-      <p:transition/>
-    </mc:Fallback>
-  </mc:AlternateContent>
-  <p:timing>
-    <p:tnLst>
-      <p:par>
-        <p:cTn xmlns:p14="http://schemas.microsoft.com/office/powerpoint/2010/main" id="1" dur="indefinite" restart="never" nodeType="tmRoot"/>
-      </p:par>
-    </p:tnLst>
-  </p:timing>
-</p:sld>
-</file>
-
-<file path=ppt/slides/slide40.xml><?xml version="1.0" encoding="utf-8"?>
+<file path=ppt/slides/slide42.xml><?xml version="1.0" encoding="utf-8"?>
 <p:sld xmlns:a="http://schemas.openxmlformats.org/drawingml/2006/main" xmlns:r="http://schemas.openxmlformats.org/officeDocument/2006/relationships" xmlns:p="http://schemas.openxmlformats.org/presentationml/2006/main">
   <p:cSld>
     <p:spTree>
@@ -29597,7 +30063,7 @@
             <a:fld id="{0D854ACF-EFF3-42D3-AB5F-408268493A1F}" type="slidenum">
               <a:rPr lang="en-US" smtClean="0"/>
               <a:pPr/>
-              <a:t>40</a:t>
+              <a:t>42</a:t>
             </a:fld>
             <a:endParaRPr lang="en-US" dirty="0"/>
           </a:p>
@@ -29624,14 +30090,14 @@
   <p:timing>
     <p:tnLst>
       <p:par>
-        <p:cTn xmlns:p14="http://schemas.microsoft.com/office/powerpoint/2010/main" id="1" dur="indefinite" restart="never" nodeType="tmRoot"/>
+        <p:cTn id="1" dur="indefinite" restart="never" nodeType="tmRoot"/>
       </p:par>
     </p:tnLst>
   </p:timing>
 </p:sld>
 </file>
 
-<file path=ppt/slides/slide41.xml><?xml version="1.0" encoding="utf-8"?>
+<file path=ppt/slides/slide43.xml><?xml version="1.0" encoding="utf-8"?>
 <p:sld xmlns:a="http://schemas.openxmlformats.org/drawingml/2006/main" xmlns:r="http://schemas.openxmlformats.org/officeDocument/2006/relationships" xmlns:p="http://schemas.openxmlformats.org/presentationml/2006/main">
   <p:cSld>
     <p:spTree>
@@ -29701,7 +30167,7 @@
             <a:fld id="{0D854ACF-EFF3-42D3-AB5F-408268493A1F}" type="slidenum">
               <a:rPr lang="en-US" smtClean="0"/>
               <a:pPr/>
-              <a:t>41</a:t>
+              <a:t>43</a:t>
             </a:fld>
             <a:endParaRPr lang="en-US" dirty="0"/>
           </a:p>
@@ -30659,7 +31125,7 @@
   <p:timing>
     <p:tnLst>
       <p:par>
-        <p:cTn xmlns:p14="http://schemas.microsoft.com/office/powerpoint/2010/main" id="1" dur="indefinite" restart="never" nodeType="tmRoot">
+        <p:cTn id="1" dur="indefinite" restart="never" nodeType="tmRoot">
           <p:childTnLst>
             <p:seq concurrent="1" nextAc="seek">
               <p:cTn id="2" dur="indefinite" nodeType="mainSeq">
@@ -30765,7 +31231,7 @@
 </p:sld>
 </file>
 
-<file path=ppt/slides/slide42.xml><?xml version="1.0" encoding="utf-8"?>
+<file path=ppt/slides/slide44.xml><?xml version="1.0" encoding="utf-8"?>
 <p:sld xmlns:a="http://schemas.openxmlformats.org/drawingml/2006/main" xmlns:r="http://schemas.openxmlformats.org/officeDocument/2006/relationships" xmlns:p="http://schemas.openxmlformats.org/presentationml/2006/main">
   <p:cSld>
     <p:spTree>
@@ -31035,7 +31501,7 @@
             <a:fld id="{0D854ACF-EFF3-42D3-AB5F-408268493A1F}" type="slidenum">
               <a:rPr lang="en-US" smtClean="0"/>
               <a:pPr/>
-              <a:t>42</a:t>
+              <a:t>44</a:t>
             </a:fld>
             <a:endParaRPr lang="en-US" dirty="0"/>
           </a:p>
@@ -31062,14 +31528,14 @@
   <p:timing>
     <p:tnLst>
       <p:par>
-        <p:cTn xmlns:p14="http://schemas.microsoft.com/office/powerpoint/2010/main" id="1" dur="indefinite" restart="never" nodeType="tmRoot"/>
+        <p:cTn id="1" dur="indefinite" restart="never" nodeType="tmRoot"/>
       </p:par>
     </p:tnLst>
   </p:timing>
 </p:sld>
 </file>
 
-<file path=ppt/slides/slide43.xml><?xml version="1.0" encoding="utf-8"?>
+<file path=ppt/slides/slide45.xml><?xml version="1.0" encoding="utf-8"?>
 <p:sld xmlns:a="http://schemas.openxmlformats.org/drawingml/2006/main" xmlns:r="http://schemas.openxmlformats.org/officeDocument/2006/relationships" xmlns:p="http://schemas.openxmlformats.org/presentationml/2006/main">
   <p:cSld>
     <p:spTree>
@@ -31213,7 +31679,7 @@
             <a:fld id="{0D854ACF-EFF3-42D3-AB5F-408268493A1F}" type="slidenum">
               <a:rPr lang="en-US" smtClean="0"/>
               <a:pPr/>
-              <a:t>43</a:t>
+              <a:t>45</a:t>
             </a:fld>
             <a:endParaRPr lang="en-US" dirty="0"/>
           </a:p>
@@ -31240,7 +31706,7 @@
   <p:timing>
     <p:tnLst>
       <p:par>
-        <p:cTn xmlns:p14="http://schemas.microsoft.com/office/powerpoint/2010/main" id="1" dur="indefinite" restart="never" nodeType="tmRoot"/>
+        <p:cTn id="1" dur="indefinite" restart="never" nodeType="tmRoot"/>
       </p:par>
     </p:tnLst>
   </p:timing>
@@ -31501,7 +31967,7 @@
   <p:timing>
     <p:tnLst>
       <p:par>
-        <p:cTn xmlns:p14="http://schemas.microsoft.com/office/powerpoint/2010/main" id="1" dur="indefinite" restart="never" nodeType="tmRoot"/>
+        <p:cTn id="1" dur="indefinite" restart="never" nodeType="tmRoot"/>
       </p:par>
     </p:tnLst>
   </p:timing>
@@ -31651,7 +32117,7 @@
   <p:timing>
     <p:tnLst>
       <p:par>
-        <p:cTn xmlns:p14="http://schemas.microsoft.com/office/powerpoint/2010/main" id="1" dur="indefinite" restart="never" nodeType="tmRoot"/>
+        <p:cTn id="1" dur="indefinite" restart="never" nodeType="tmRoot"/>
       </p:par>
     </p:tnLst>
   </p:timing>
@@ -32212,7 +32678,7 @@
   <p:timing>
     <p:tnLst>
       <p:par>
-        <p:cTn xmlns:p14="http://schemas.microsoft.com/office/powerpoint/2010/main" id="1" dur="indefinite" restart="never" nodeType="tmRoot"/>
+        <p:cTn id="1" dur="indefinite" restart="never" nodeType="tmRoot"/>
       </p:par>
     </p:tnLst>
   </p:timing>
@@ -33530,7 +33996,7 @@
   <p:timing>
     <p:tnLst>
       <p:par>
-        <p:cTn xmlns:p14="http://schemas.microsoft.com/office/powerpoint/2010/main" id="1" dur="indefinite" restart="never" nodeType="tmRoot">
+        <p:cTn id="1" dur="indefinite" restart="never" nodeType="tmRoot">
           <p:childTnLst>
             <p:seq concurrent="1" nextAc="seek">
               <p:cTn id="2" dur="indefinite" nodeType="mainSeq">
@@ -33873,7 +34339,7 @@
   <p:timing>
     <p:tnLst>
       <p:par>
-        <p:cTn xmlns:p14="http://schemas.microsoft.com/office/powerpoint/2010/main" id="1" dur="indefinite" restart="never" nodeType="tmRoot"/>
+        <p:cTn id="1" dur="indefinite" restart="never" nodeType="tmRoot"/>
       </p:par>
     </p:tnLst>
   </p:timing>

</xml_diff>